<commit_message>
Added updated presentation and flowchart
Added updated presentation and flowchart for project
</commit_message>
<xml_diff>
--- a/Documents/Minor Project Progress.pptx
+++ b/Documents/Minor Project Progress.pptx
@@ -5,7 +5,7 @@
     <p:sldMasterId id="2147483648" r:id="rId1"/>
   </p:sldMasterIdLst>
   <p:notesMasterIdLst>
-    <p:notesMasterId r:id="rId22"/>
+    <p:notesMasterId r:id="rId23"/>
   </p:notesMasterIdLst>
   <p:sldIdLst>
     <p:sldId id="256" r:id="rId2"/>
@@ -15,19 +15,20 @@
     <p:sldId id="269" r:id="rId6"/>
     <p:sldId id="260" r:id="rId7"/>
     <p:sldId id="276" r:id="rId8"/>
-    <p:sldId id="261" r:id="rId9"/>
-    <p:sldId id="262" r:id="rId10"/>
-    <p:sldId id="263" r:id="rId11"/>
-    <p:sldId id="264" r:id="rId12"/>
-    <p:sldId id="275" r:id="rId13"/>
-    <p:sldId id="268" r:id="rId14"/>
-    <p:sldId id="270" r:id="rId15"/>
-    <p:sldId id="271" r:id="rId16"/>
-    <p:sldId id="272" r:id="rId17"/>
-    <p:sldId id="273" r:id="rId18"/>
-    <p:sldId id="274" r:id="rId19"/>
-    <p:sldId id="265" r:id="rId20"/>
-    <p:sldId id="267" r:id="rId21"/>
+    <p:sldId id="277" r:id="rId9"/>
+    <p:sldId id="261" r:id="rId10"/>
+    <p:sldId id="262" r:id="rId11"/>
+    <p:sldId id="263" r:id="rId12"/>
+    <p:sldId id="264" r:id="rId13"/>
+    <p:sldId id="275" r:id="rId14"/>
+    <p:sldId id="268" r:id="rId15"/>
+    <p:sldId id="270" r:id="rId16"/>
+    <p:sldId id="271" r:id="rId17"/>
+    <p:sldId id="272" r:id="rId18"/>
+    <p:sldId id="273" r:id="rId19"/>
+    <p:sldId id="274" r:id="rId20"/>
+    <p:sldId id="265" r:id="rId21"/>
+    <p:sldId id="267" r:id="rId22"/>
   </p:sldIdLst>
   <p:sldSz cx="12192000" cy="6858000"/>
   <p:notesSz cx="6858000" cy="9144000"/>
@@ -227,7 +228,7 @@
           <a:p>
             <a:fld id="{BEDB5C10-49B4-5D48-BF65-94FE865BEF32}" type="datetimeFigureOut">
               <a:rPr lang="en-US" smtClean="0"/>
-              <a:t>10/3/2024</a:t>
+              <a:t>10/4/2024</a:t>
             </a:fld>
             <a:endParaRPr lang="en-US"/>
           </a:p>
@@ -728,7 +729,7 @@
           <a:p>
             <a:fld id="{8CFC57F7-339F-5D4E-9C16-8034D4D8F44B}" type="datetime1">
               <a:rPr lang="en-IN" smtClean="0"/>
-              <a:t>03-10-2024</a:t>
+              <a:t>04-10-2024</a:t>
             </a:fld>
             <a:endParaRPr lang="en-US"/>
           </a:p>
@@ -958,7 +959,7 @@
           <a:p>
             <a:fld id="{02BF4B0B-2620-054A-A94C-30269E627EC8}" type="datetime1">
               <a:rPr lang="en-IN" smtClean="0"/>
-              <a:t>03-10-2024</a:t>
+              <a:t>04-10-2024</a:t>
             </a:fld>
             <a:endParaRPr lang="en-US"/>
           </a:p>
@@ -1215,7 +1216,7 @@
           <a:p>
             <a:fld id="{DCBDC50B-D7E9-3E46-BF97-BF9CDB3195D0}" type="datetime1">
               <a:rPr lang="en-IN" smtClean="0"/>
-              <a:t>03-10-2024</a:t>
+              <a:t>04-10-2024</a:t>
             </a:fld>
             <a:endParaRPr lang="en-US"/>
           </a:p>
@@ -1462,7 +1463,7 @@
           <a:p>
             <a:fld id="{3E200D22-A913-914D-B06C-E294256DAC47}" type="datetime1">
               <a:rPr lang="en-IN" smtClean="0"/>
-              <a:t>03-10-2024</a:t>
+              <a:t>04-10-2024</a:t>
             </a:fld>
             <a:endParaRPr lang="en-US"/>
           </a:p>
@@ -1785,7 +1786,7 @@
           <a:p>
             <a:fld id="{8CDB6A68-8223-6847-B1AF-BF63A0263AB5}" type="datetime1">
               <a:rPr lang="en-IN" smtClean="0"/>
-              <a:t>03-10-2024</a:t>
+              <a:t>04-10-2024</a:t>
             </a:fld>
             <a:endParaRPr lang="en-US"/>
           </a:p>
@@ -2100,7 +2101,7 @@
           <a:p>
             <a:fld id="{053FC1C6-C8DC-EF4A-9E19-D275438CC94E}" type="datetime1">
               <a:rPr lang="en-IN" smtClean="0"/>
-              <a:t>03-10-2024</a:t>
+              <a:t>04-10-2024</a:t>
             </a:fld>
             <a:endParaRPr lang="en-US"/>
           </a:p>
@@ -2562,7 +2563,7 @@
           <a:p>
             <a:fld id="{6BC28AC0-8765-9A41-8D41-2D369A30419F}" type="datetime1">
               <a:rPr lang="en-IN" smtClean="0"/>
-              <a:t>03-10-2024</a:t>
+              <a:t>04-10-2024</a:t>
             </a:fld>
             <a:endParaRPr lang="en-US"/>
           </a:p>
@@ -2751,7 +2752,7 @@
           <a:p>
             <a:fld id="{D6A964F1-95CF-6C42-9838-A5F69B082EFF}" type="datetime1">
               <a:rPr lang="en-IN" smtClean="0"/>
-              <a:t>03-10-2024</a:t>
+              <a:t>04-10-2024</a:t>
             </a:fld>
             <a:endParaRPr lang="en-US"/>
           </a:p>
@@ -2911,7 +2912,7 @@
           <a:p>
             <a:fld id="{78272B36-632B-7A41-964B-2177780C3D38}" type="datetime1">
               <a:rPr lang="en-IN" smtClean="0"/>
-              <a:t>03-10-2024</a:t>
+              <a:t>04-10-2024</a:t>
             </a:fld>
             <a:endParaRPr lang="en-US"/>
           </a:p>
@@ -3271,7 +3272,7 @@
           <a:p>
             <a:fld id="{2BAA03F7-9209-1D4D-ACF6-F8BE8F7678A9}" type="datetime1">
               <a:rPr lang="en-IN" smtClean="0"/>
-              <a:t>03-10-2024</a:t>
+              <a:t>04-10-2024</a:t>
             </a:fld>
             <a:endParaRPr lang="en-US"/>
           </a:p>
@@ -3607,7 +3608,7 @@
           <a:p>
             <a:fld id="{7FDBAFD6-0457-864B-9DFE-FF4ABF0A6ED6}" type="datetime1">
               <a:rPr lang="en-IN" smtClean="0"/>
-              <a:t>03-10-2024</a:t>
+              <a:t>04-10-2024</a:t>
             </a:fld>
             <a:endParaRPr lang="en-US"/>
           </a:p>
@@ -3897,7 +3898,7 @@
           <a:p>
             <a:fld id="{C8373BDE-C960-2747-AB88-84FEF7968BD6}" type="datetime1">
               <a:rPr lang="en-IN" smtClean="0"/>
-              <a:t>03-10-2024</a:t>
+              <a:t>04-10-2024</a:t>
             </a:fld>
             <a:endParaRPr lang="en-US"/>
           </a:p>
@@ -5489,7 +5490,7 @@
           <p:cNvPr id="2" name="Title 1">
             <a:extLst>
               <a:ext uri="{FF2B5EF4-FFF2-40B4-BE49-F238E27FC236}">
-                <a16:creationId xmlns:a16="http://schemas.microsoft.com/office/drawing/2014/main" id="{9EFA484F-E38E-4261-FB2C-B6EA2C008EF3}"/>
+                <a16:creationId xmlns:a16="http://schemas.microsoft.com/office/drawing/2014/main" id="{08EA45C0-3F3A-61CC-368A-7B4BB80C5B8D}"/>
               </a:ext>
             </a:extLst>
           </p:cNvPr>
@@ -5507,7 +5508,7 @@
           <a:p>
             <a:r>
               <a:rPr lang="en-US" dirty="0"/>
-              <a:t>Scope of Project</a:t>
+              <a:t>Discussions</a:t>
             </a:r>
           </a:p>
         </p:txBody>
@@ -5517,7 +5518,7 @@
           <p:cNvPr id="3" name="Content Placeholder 2">
             <a:extLst>
               <a:ext uri="{FF2B5EF4-FFF2-40B4-BE49-F238E27FC236}">
-                <a16:creationId xmlns:a16="http://schemas.microsoft.com/office/drawing/2014/main" id="{83681EDE-9141-D46D-C388-58094B221F12}"/>
+                <a16:creationId xmlns:a16="http://schemas.microsoft.com/office/drawing/2014/main" id="{6B468376-38B7-27CF-F713-A8C458AC65ED}"/>
               </a:ext>
             </a:extLst>
           </p:cNvPr>
@@ -5531,7 +5532,7 @@
         <p:spPr/>
         <p:txBody>
           <a:bodyPr>
-            <a:normAutofit fontScale="85000" lnSpcReduction="10000"/>
+            <a:normAutofit fontScale="92500" lnSpcReduction="20000"/>
           </a:bodyPr>
           <a:lstStyle/>
           <a:p>
@@ -5543,7 +5544,7 @@
                 <a:latin typeface="Times New Roman" panose="02020603050405020304" pitchFamily="18" charset="0"/>
                 <a:cs typeface="Times New Roman" panose="02020603050405020304" pitchFamily="18" charset="0"/>
               </a:rPr>
-              <a:t>The </a:t>
+              <a:t>Our project, </a:t>
             </a:r>
             <a:r>
               <a:rPr lang="en-US" b="1" dirty="0">
@@ -5557,7 +5558,7 @@
                 <a:latin typeface="Times New Roman" panose="02020603050405020304" pitchFamily="18" charset="0"/>
                 <a:cs typeface="Times New Roman" panose="02020603050405020304" pitchFamily="18" charset="0"/>
               </a:rPr>
-              <a:t> project aims to build a hybrid model that integrates numerical stock data and textual analysis from financial news. The scope includes:</a:t>
+              <a:t>, focuses on predicting stock prices using both numerical data and financial news.</a:t>
             </a:r>
           </a:p>
           <a:p>
@@ -5570,28 +5571,70 @@
                 <a:latin typeface="Times New Roman" panose="02020603050405020304" pitchFamily="18" charset="0"/>
                 <a:cs typeface="Times New Roman" panose="02020603050405020304" pitchFamily="18" charset="0"/>
               </a:rPr>
-              <a:t>Data Collection and Preprocessing</a:t>
+              <a:t>Dataset Preparation</a:t>
             </a:r>
             <a:r>
               <a:rPr lang="en-US" dirty="0">
                 <a:latin typeface="Times New Roman" panose="02020603050405020304" pitchFamily="18" charset="0"/>
                 <a:cs typeface="Times New Roman" panose="02020603050405020304" pitchFamily="18" charset="0"/>
               </a:rPr>
-              <a:t>: Handling time-series stock data (TCS and Google) and textual data (financial news) with </a:t>
-            </a:r>
-            <a:r>
-              <a:rPr lang="en-US" dirty="0" err="1">
+              <a:t>: We've completed </a:t>
+            </a:r>
+            <a:r>
+              <a:rPr lang="en-US" b="1" dirty="0">
                 <a:latin typeface="Times New Roman" panose="02020603050405020304" pitchFamily="18" charset="0"/>
                 <a:cs typeface="Times New Roman" panose="02020603050405020304" pitchFamily="18" charset="0"/>
               </a:rPr>
-              <a:t>InfluxDB</a:t>
+              <a:t>data preprocessing</a:t>
             </a:r>
             <a:r>
               <a:rPr lang="en-US" dirty="0">
                 <a:latin typeface="Times New Roman" panose="02020603050405020304" pitchFamily="18" charset="0"/>
                 <a:cs typeface="Times New Roman" panose="02020603050405020304" pitchFamily="18" charset="0"/>
               </a:rPr>
-              <a:t> for storage and using NLP for textual sentiment analysis.</a:t>
+              <a:t> and </a:t>
+            </a:r>
+            <a:r>
+              <a:rPr lang="en-US" b="1" dirty="0">
+                <a:latin typeface="Times New Roman" panose="02020603050405020304" pitchFamily="18" charset="0"/>
+                <a:cs typeface="Times New Roman" panose="02020603050405020304" pitchFamily="18" charset="0"/>
+              </a:rPr>
+              <a:t>EDA</a:t>
+            </a:r>
+            <a:r>
+              <a:rPr lang="en-US" dirty="0">
+                <a:latin typeface="Times New Roman" panose="02020603050405020304" pitchFamily="18" charset="0"/>
+                <a:cs typeface="Times New Roman" panose="02020603050405020304" pitchFamily="18" charset="0"/>
+              </a:rPr>
+              <a:t> for stock data from </a:t>
+            </a:r>
+            <a:r>
+              <a:rPr lang="en-US" b="1" dirty="0">
+                <a:latin typeface="Times New Roman" panose="02020603050405020304" pitchFamily="18" charset="0"/>
+                <a:cs typeface="Times New Roman" panose="02020603050405020304" pitchFamily="18" charset="0"/>
+              </a:rPr>
+              <a:t>TCS</a:t>
+            </a:r>
+            <a:r>
+              <a:rPr lang="en-US" dirty="0">
+                <a:latin typeface="Times New Roman" panose="02020603050405020304" pitchFamily="18" charset="0"/>
+                <a:cs typeface="Times New Roman" panose="02020603050405020304" pitchFamily="18" charset="0"/>
+              </a:rPr>
+              <a:t> and </a:t>
+            </a:r>
+            <a:r>
+              <a:rPr lang="en-US" b="1" dirty="0">
+                <a:latin typeface="Times New Roman" panose="02020603050405020304" pitchFamily="18" charset="0"/>
+                <a:cs typeface="Times New Roman" panose="02020603050405020304" pitchFamily="18" charset="0"/>
+              </a:rPr>
+              <a:t>Google</a:t>
+            </a:r>
+            <a:r>
+              <a:rPr lang="en-US" dirty="0">
+                <a:latin typeface="Times New Roman" panose="02020603050405020304" pitchFamily="18" charset="0"/>
+                <a:cs typeface="Times New Roman" panose="02020603050405020304" pitchFamily="18" charset="0"/>
+              </a:rPr>
+              <a:t>, which will be integrated into the model.</a:t>
             </a:r>
           </a:p>
           <a:p>
@@ -5604,14 +5647,28 @@
                 <a:latin typeface="Times New Roman" panose="02020603050405020304" pitchFamily="18" charset="0"/>
                 <a:cs typeface="Times New Roman" panose="02020603050405020304" pitchFamily="18" charset="0"/>
               </a:rPr>
-              <a:t>Model Building</a:t>
+              <a:t>Text Data Preprocessing</a:t>
             </a:r>
             <a:r>
               <a:rPr lang="en-US" dirty="0">
                 <a:latin typeface="Times New Roman" panose="02020603050405020304" pitchFamily="18" charset="0"/>
                 <a:cs typeface="Times New Roman" panose="02020603050405020304" pitchFamily="18" charset="0"/>
               </a:rPr>
-              <a:t>: Developing separate models for numerical data and textual data, followed by integration into a hybrid model for enhanced prediction accuracy.</a:t>
+              <a:t>: Initial </a:t>
+            </a:r>
+            <a:r>
+              <a:rPr lang="en-US" b="1" dirty="0">
+                <a:latin typeface="Times New Roman" panose="02020603050405020304" pitchFamily="18" charset="0"/>
+                <a:cs typeface="Times New Roman" panose="02020603050405020304" pitchFamily="18" charset="0"/>
+              </a:rPr>
+              <a:t>cleaning and preprocessing</a:t>
+            </a:r>
+            <a:r>
+              <a:rPr lang="en-US" dirty="0">
+                <a:latin typeface="Times New Roman" panose="02020603050405020304" pitchFamily="18" charset="0"/>
+                <a:cs typeface="Times New Roman" panose="02020603050405020304" pitchFamily="18" charset="0"/>
+              </a:rPr>
+              <a:t> of financial news data is underway for sentiment analysis.</a:t>
             </a:r>
           </a:p>
           <a:p>
@@ -5624,42 +5681,14 @@
                 <a:latin typeface="Times New Roman" panose="02020603050405020304" pitchFamily="18" charset="0"/>
                 <a:cs typeface="Times New Roman" panose="02020603050405020304" pitchFamily="18" charset="0"/>
               </a:rPr>
-              <a:t>Visualization and Deployment</a:t>
+              <a:t>Research and Learning</a:t>
             </a:r>
             <a:r>
               <a:rPr lang="en-US" dirty="0">
                 <a:latin typeface="Times New Roman" panose="02020603050405020304" pitchFamily="18" charset="0"/>
                 <a:cs typeface="Times New Roman" panose="02020603050405020304" pitchFamily="18" charset="0"/>
               </a:rPr>
-              <a:t>: Deploying the model using </a:t>
-            </a:r>
-            <a:r>
-              <a:rPr lang="en-US" b="1" dirty="0" err="1">
-                <a:latin typeface="Times New Roman" panose="02020603050405020304" pitchFamily="18" charset="0"/>
-                <a:cs typeface="Times New Roman" panose="02020603050405020304" pitchFamily="18" charset="0"/>
-              </a:rPr>
-              <a:t>Streamlit</a:t>
-            </a:r>
-            <a:r>
-              <a:rPr lang="en-US" dirty="0">
-                <a:latin typeface="Times New Roman" panose="02020603050405020304" pitchFamily="18" charset="0"/>
-                <a:cs typeface="Times New Roman" panose="02020603050405020304" pitchFamily="18" charset="0"/>
-              </a:rPr>
-              <a:t> and creating a </a:t>
-            </a:r>
-            <a:r>
-              <a:rPr lang="en-US" b="1" dirty="0">
-                <a:latin typeface="Times New Roman" panose="02020603050405020304" pitchFamily="18" charset="0"/>
-                <a:cs typeface="Times New Roman" panose="02020603050405020304" pitchFamily="18" charset="0"/>
-              </a:rPr>
-              <a:t>Grafana</a:t>
-            </a:r>
-            <a:r>
-              <a:rPr lang="en-US" dirty="0">
-                <a:latin typeface="Times New Roman" panose="02020603050405020304" pitchFamily="18" charset="0"/>
-                <a:cs typeface="Times New Roman" panose="02020603050405020304" pitchFamily="18" charset="0"/>
-              </a:rPr>
-              <a:t> dashboard for real-time and historical stock data visualization.</a:t>
+              <a:t>: We are reviewing research papers and algorithms. We plan to build separate models for numerical and textual data before integrating them into a hybrid model.</a:t>
             </a:r>
           </a:p>
           <a:p>
@@ -5672,14 +5701,70 @@
                 <a:latin typeface="Times New Roman" panose="02020603050405020304" pitchFamily="18" charset="0"/>
                 <a:cs typeface="Times New Roman" panose="02020603050405020304" pitchFamily="18" charset="0"/>
               </a:rPr>
-              <a:t>Scalability</a:t>
+              <a:t>Next Steps</a:t>
             </a:r>
             <a:r>
               <a:rPr lang="en-US" dirty="0">
                 <a:latin typeface="Times New Roman" panose="02020603050405020304" pitchFamily="18" charset="0"/>
                 <a:cs typeface="Times New Roman" panose="02020603050405020304" pitchFamily="18" charset="0"/>
               </a:rPr>
-              <a:t>: Ensuring the system is scalable for future expansions, both in terms of larger datasets and more complex models.</a:t>
+              <a:t>: The next phase includes </a:t>
+            </a:r>
+            <a:r>
+              <a:rPr lang="en-US" b="1" dirty="0">
+                <a:latin typeface="Times New Roman" panose="02020603050405020304" pitchFamily="18" charset="0"/>
+                <a:cs typeface="Times New Roman" panose="02020603050405020304" pitchFamily="18" charset="0"/>
+              </a:rPr>
+              <a:t>model building</a:t>
+            </a:r>
+            <a:r>
+              <a:rPr lang="en-US" dirty="0">
+                <a:latin typeface="Times New Roman" panose="02020603050405020304" pitchFamily="18" charset="0"/>
+                <a:cs typeface="Times New Roman" panose="02020603050405020304" pitchFamily="18" charset="0"/>
+              </a:rPr>
+              <a:t> and integration, followed by </a:t>
+            </a:r>
+            <a:r>
+              <a:rPr lang="en-US" b="1" dirty="0">
+                <a:latin typeface="Times New Roman" panose="02020603050405020304" pitchFamily="18" charset="0"/>
+                <a:cs typeface="Times New Roman" panose="02020603050405020304" pitchFamily="18" charset="0"/>
+              </a:rPr>
+              <a:t>deployment</a:t>
+            </a:r>
+            <a:r>
+              <a:rPr lang="en-US" dirty="0">
+                <a:latin typeface="Times New Roman" panose="02020603050405020304" pitchFamily="18" charset="0"/>
+                <a:cs typeface="Times New Roman" panose="02020603050405020304" pitchFamily="18" charset="0"/>
+              </a:rPr>
+              <a:t> on </a:t>
+            </a:r>
+            <a:r>
+              <a:rPr lang="en-US" b="1" dirty="0" err="1">
+                <a:latin typeface="Times New Roman" panose="02020603050405020304" pitchFamily="18" charset="0"/>
+                <a:cs typeface="Times New Roman" panose="02020603050405020304" pitchFamily="18" charset="0"/>
+              </a:rPr>
+              <a:t>Streamlit</a:t>
+            </a:r>
+            <a:r>
+              <a:rPr lang="en-US" dirty="0">
+                <a:latin typeface="Times New Roman" panose="02020603050405020304" pitchFamily="18" charset="0"/>
+                <a:cs typeface="Times New Roman" panose="02020603050405020304" pitchFamily="18" charset="0"/>
+              </a:rPr>
+              <a:t> and creating the </a:t>
+            </a:r>
+            <a:r>
+              <a:rPr lang="en-US" b="1" dirty="0">
+                <a:latin typeface="Times New Roman" panose="02020603050405020304" pitchFamily="18" charset="0"/>
+                <a:cs typeface="Times New Roman" panose="02020603050405020304" pitchFamily="18" charset="0"/>
+              </a:rPr>
+              <a:t>Grafana dashboard</a:t>
+            </a:r>
+            <a:r>
+              <a:rPr lang="en-US" dirty="0">
+                <a:latin typeface="Times New Roman" panose="02020603050405020304" pitchFamily="18" charset="0"/>
+                <a:cs typeface="Times New Roman" panose="02020603050405020304" pitchFamily="18" charset="0"/>
+              </a:rPr>
+              <a:t> for visualization.</a:t>
             </a:r>
           </a:p>
         </p:txBody>
@@ -5689,7 +5774,7 @@
           <p:cNvPr id="4" name="Date Placeholder 3">
             <a:extLst>
               <a:ext uri="{FF2B5EF4-FFF2-40B4-BE49-F238E27FC236}">
-                <a16:creationId xmlns:a16="http://schemas.microsoft.com/office/drawing/2014/main" id="{9A3B0F8D-0096-90FF-58FB-A329F382A148}"/>
+                <a16:creationId xmlns:a16="http://schemas.microsoft.com/office/drawing/2014/main" id="{B8710486-8FC9-8B1F-8A38-035C2C636324}"/>
               </a:ext>
             </a:extLst>
           </p:cNvPr>
@@ -5707,7 +5792,7 @@
           <a:p>
             <a:fld id="{3E200D22-A913-914D-B06C-E294256DAC47}" type="datetime1">
               <a:rPr lang="en-IN" smtClean="0"/>
-              <a:t>03-10-2024</a:t>
+              <a:t>04-10-2024</a:t>
             </a:fld>
             <a:endParaRPr lang="en-US"/>
           </a:p>
@@ -5718,7 +5803,7 @@
           <p:cNvPr id="5" name="Slide Number Placeholder 4">
             <a:extLst>
               <a:ext uri="{FF2B5EF4-FFF2-40B4-BE49-F238E27FC236}">
-                <a16:creationId xmlns:a16="http://schemas.microsoft.com/office/drawing/2014/main" id="{613503A7-DC42-3131-B40B-E4E4975A6E34}"/>
+                <a16:creationId xmlns:a16="http://schemas.microsoft.com/office/drawing/2014/main" id="{16693735-9CDF-80AD-786C-D35A5F4A7C89}"/>
               </a:ext>
             </a:extLst>
           </p:cNvPr>
@@ -5745,7 +5830,7 @@
     </p:spTree>
     <p:extLst>
       <p:ext uri="{BB962C8B-B14F-4D97-AF65-F5344CB8AC3E}">
-        <p14:creationId xmlns:p14="http://schemas.microsoft.com/office/powerpoint/2010/main" val="1684016132"/>
+        <p14:creationId xmlns:p14="http://schemas.microsoft.com/office/powerpoint/2010/main" val="3800335998"/>
       </p:ext>
     </p:extLst>
   </p:cSld>
@@ -5777,7 +5862,7 @@
           <p:cNvPr id="2" name="Title 1">
             <a:extLst>
               <a:ext uri="{FF2B5EF4-FFF2-40B4-BE49-F238E27FC236}">
-                <a16:creationId xmlns:a16="http://schemas.microsoft.com/office/drawing/2014/main" id="{2ABC3314-BFBE-2297-4F63-0EA2A01F9ECC}"/>
+                <a16:creationId xmlns:a16="http://schemas.microsoft.com/office/drawing/2014/main" id="{9EFA484F-E38E-4261-FB2C-B6EA2C008EF3}"/>
               </a:ext>
             </a:extLst>
           </p:cNvPr>
@@ -5795,7 +5880,7 @@
           <a:p>
             <a:r>
               <a:rPr lang="en-US" dirty="0"/>
-              <a:t>Progress So far</a:t>
+              <a:t>Scope of Project</a:t>
             </a:r>
           </a:p>
         </p:txBody>
@@ -5805,7 +5890,7 @@
           <p:cNvPr id="3" name="Content Placeholder 2">
             <a:extLst>
               <a:ext uri="{FF2B5EF4-FFF2-40B4-BE49-F238E27FC236}">
-                <a16:creationId xmlns:a16="http://schemas.microsoft.com/office/drawing/2014/main" id="{01E66CA6-E107-EA0A-DE24-B00CED43A879}"/>
+                <a16:creationId xmlns:a16="http://schemas.microsoft.com/office/drawing/2014/main" id="{83681EDE-9141-D46D-C388-58094B221F12}"/>
               </a:ext>
             </a:extLst>
           </p:cNvPr>
@@ -5819,223 +5904,155 @@
         <p:spPr/>
         <p:txBody>
           <a:bodyPr>
-            <a:noAutofit/>
+            <a:normAutofit fontScale="85000" lnSpcReduction="10000"/>
           </a:bodyPr>
           <a:lstStyle/>
           <a:p>
-            <a:pPr marL="457200" indent="-457200" algn="just">
+            <a:pPr marL="0" indent="0" algn="just">
+              <a:buNone/>
+            </a:pPr>
+            <a:r>
+              <a:rPr lang="en-US" dirty="0">
+                <a:latin typeface="Times New Roman" panose="02020603050405020304" pitchFamily="18" charset="0"/>
+                <a:cs typeface="Times New Roman" panose="02020603050405020304" pitchFamily="18" charset="0"/>
+              </a:rPr>
+              <a:t>The </a:t>
+            </a:r>
+            <a:r>
+              <a:rPr lang="en-US" b="1" dirty="0">
+                <a:latin typeface="Times New Roman" panose="02020603050405020304" pitchFamily="18" charset="0"/>
+                <a:cs typeface="Times New Roman" panose="02020603050405020304" pitchFamily="18" charset="0"/>
+              </a:rPr>
+              <a:t>Advanced Stock Price Forecasting Using a Hybrid Model of Numerical and Textual Analysis</a:t>
+            </a:r>
+            <a:r>
+              <a:rPr lang="en-US" dirty="0">
+                <a:latin typeface="Times New Roman" panose="02020603050405020304" pitchFamily="18" charset="0"/>
+                <a:cs typeface="Times New Roman" panose="02020603050405020304" pitchFamily="18" charset="0"/>
+              </a:rPr>
+              <a:t> project aims to build a hybrid model that integrates numerical stock data and textual analysis from financial news. The scope includes:</a:t>
+            </a:r>
+          </a:p>
+          <a:p>
+            <a:pPr algn="just">
               <a:buFont typeface="+mj-lt"/>
               <a:buAutoNum type="arabicPeriod"/>
             </a:pPr>
             <a:r>
-              <a:rPr lang="en-US" sz="2200" b="1" dirty="0">
-                <a:solidFill>
-                  <a:schemeClr val="tx2"/>
-                </a:solidFill>
+              <a:rPr lang="en-US" b="1" dirty="0">
                 <a:latin typeface="Times New Roman" panose="02020603050405020304" pitchFamily="18" charset="0"/>
                 <a:cs typeface="Times New Roman" panose="02020603050405020304" pitchFamily="18" charset="0"/>
               </a:rPr>
-              <a:t>Dataset Analysis and Selection</a:t>
-            </a:r>
-            <a:r>
-              <a:rPr lang="en-US" sz="2200" dirty="0">
-                <a:solidFill>
-                  <a:schemeClr val="tx2"/>
-                </a:solidFill>
+              <a:t>Data Collection and Preprocessing</a:t>
+            </a:r>
+            <a:r>
+              <a:rPr lang="en-US" dirty="0">
                 <a:latin typeface="Times New Roman" panose="02020603050405020304" pitchFamily="18" charset="0"/>
                 <a:cs typeface="Times New Roman" panose="02020603050405020304" pitchFamily="18" charset="0"/>
               </a:rPr>
-              <a:t>: We have analyzed multiple available datasets and finalized two key datasets—</a:t>
-            </a:r>
-            <a:r>
-              <a:rPr lang="en-US" sz="2200" b="1" dirty="0">
-                <a:solidFill>
-                  <a:schemeClr val="tx2"/>
-                </a:solidFill>
+              <a:t>: Handling time-series stock data (TCS and Google) and textual data (financial news) with </a:t>
+            </a:r>
+            <a:r>
+              <a:rPr lang="en-US" dirty="0" err="1">
                 <a:latin typeface="Times New Roman" panose="02020603050405020304" pitchFamily="18" charset="0"/>
                 <a:cs typeface="Times New Roman" panose="02020603050405020304" pitchFamily="18" charset="0"/>
               </a:rPr>
-              <a:t>TCS</a:t>
-            </a:r>
-            <a:r>
-              <a:rPr lang="en-US" sz="2200" dirty="0">
-                <a:solidFill>
-                  <a:schemeClr val="tx2"/>
-                </a:solidFill>
+              <a:t>InfluxDB</a:t>
+            </a:r>
+            <a:r>
+              <a:rPr lang="en-US" dirty="0">
                 <a:latin typeface="Times New Roman" panose="02020603050405020304" pitchFamily="18" charset="0"/>
                 <a:cs typeface="Times New Roman" panose="02020603050405020304" pitchFamily="18" charset="0"/>
               </a:rPr>
-              <a:t> and </a:t>
-            </a:r>
-            <a:r>
-              <a:rPr lang="en-US" sz="2200" b="1" dirty="0">
-                <a:solidFill>
-                  <a:schemeClr val="tx2"/>
-                </a:solidFill>
-                <a:latin typeface="Times New Roman" panose="02020603050405020304" pitchFamily="18" charset="0"/>
-                <a:cs typeface="Times New Roman" panose="02020603050405020304" pitchFamily="18" charset="0"/>
-              </a:rPr>
-              <a:t>Google</a:t>
-            </a:r>
-            <a:r>
-              <a:rPr lang="en-US" sz="2200" dirty="0">
-                <a:solidFill>
-                  <a:schemeClr val="tx2"/>
-                </a:solidFill>
-                <a:latin typeface="Times New Roman" panose="02020603050405020304" pitchFamily="18" charset="0"/>
-                <a:cs typeface="Times New Roman" panose="02020603050405020304" pitchFamily="18" charset="0"/>
-              </a:rPr>
-              <a:t>—for training our model. These datasets contain stock-related columns such as:</a:t>
-            </a:r>
-          </a:p>
-          <a:p>
-            <a:pPr marL="914400" lvl="1" indent="-457200" algn="just">
+              <a:t> for storage and using NLP for textual sentiment analysis.</a:t>
+            </a:r>
+          </a:p>
+          <a:p>
+            <a:pPr algn="just">
               <a:buFont typeface="+mj-lt"/>
               <a:buAutoNum type="arabicPeriod"/>
             </a:pPr>
             <a:r>
-              <a:rPr lang="en-US" sz="2200" b="1" dirty="0">
-                <a:solidFill>
-                  <a:schemeClr val="tx2"/>
-                </a:solidFill>
+              <a:rPr lang="en-US" b="1" dirty="0">
                 <a:latin typeface="Times New Roman" panose="02020603050405020304" pitchFamily="18" charset="0"/>
                 <a:cs typeface="Times New Roman" panose="02020603050405020304" pitchFamily="18" charset="0"/>
               </a:rPr>
-              <a:t>Date</a:t>
-            </a:r>
-            <a:r>
-              <a:rPr lang="en-US" sz="2200" dirty="0">
-                <a:solidFill>
-                  <a:schemeClr val="tx2"/>
-                </a:solidFill>
+              <a:t>Model Building</a:t>
+            </a:r>
+            <a:r>
+              <a:rPr lang="en-US" dirty="0">
                 <a:latin typeface="Times New Roman" panose="02020603050405020304" pitchFamily="18" charset="0"/>
                 <a:cs typeface="Times New Roman" panose="02020603050405020304" pitchFamily="18" charset="0"/>
               </a:rPr>
-              <a:t>: The trading date (to be used as the index).</a:t>
-            </a:r>
-          </a:p>
-          <a:p>
-            <a:pPr marL="914400" lvl="1" indent="-457200" algn="just">
+              <a:t>: Developing separate models for numerical data and textual data, followed by integration into a hybrid model for enhanced prediction accuracy.</a:t>
+            </a:r>
+          </a:p>
+          <a:p>
+            <a:pPr algn="just">
               <a:buFont typeface="+mj-lt"/>
               <a:buAutoNum type="arabicPeriod"/>
             </a:pPr>
             <a:r>
-              <a:rPr lang="en-US" sz="2200" b="1" dirty="0">
-                <a:solidFill>
-                  <a:schemeClr val="tx2"/>
-                </a:solidFill>
+              <a:rPr lang="en-US" b="1" dirty="0">
                 <a:latin typeface="Times New Roman" panose="02020603050405020304" pitchFamily="18" charset="0"/>
                 <a:cs typeface="Times New Roman" panose="02020603050405020304" pitchFamily="18" charset="0"/>
               </a:rPr>
-              <a:t>Open, High, Low, Close: </a:t>
-            </a:r>
-            <a:r>
-              <a:rPr lang="en-US" sz="2200" dirty="0">
-                <a:solidFill>
-                  <a:schemeClr val="tx2"/>
-                </a:solidFill>
+              <a:t>Visualization and Deployment</a:t>
+            </a:r>
+            <a:r>
+              <a:rPr lang="en-US" dirty="0">
                 <a:latin typeface="Times New Roman" panose="02020603050405020304" pitchFamily="18" charset="0"/>
                 <a:cs typeface="Times New Roman" panose="02020603050405020304" pitchFamily="18" charset="0"/>
               </a:rPr>
-              <a:t>The stock prices at the opening, highest, lowest, and closing times of the day.</a:t>
-            </a:r>
-          </a:p>
-          <a:p>
-            <a:pPr marL="914400" lvl="1" indent="-457200" algn="just">
+              <a:t>: Deploying the model using </a:t>
+            </a:r>
+            <a:r>
+              <a:rPr lang="en-US" b="1" dirty="0" err="1">
+                <a:latin typeface="Times New Roman" panose="02020603050405020304" pitchFamily="18" charset="0"/>
+                <a:cs typeface="Times New Roman" panose="02020603050405020304" pitchFamily="18" charset="0"/>
+              </a:rPr>
+              <a:t>Streamlit</a:t>
+            </a:r>
+            <a:r>
+              <a:rPr lang="en-US" dirty="0">
+                <a:latin typeface="Times New Roman" panose="02020603050405020304" pitchFamily="18" charset="0"/>
+                <a:cs typeface="Times New Roman" panose="02020603050405020304" pitchFamily="18" charset="0"/>
+              </a:rPr>
+              <a:t> and creating a </a:t>
+            </a:r>
+            <a:r>
+              <a:rPr lang="en-US" b="1" dirty="0">
+                <a:latin typeface="Times New Roman" panose="02020603050405020304" pitchFamily="18" charset="0"/>
+                <a:cs typeface="Times New Roman" panose="02020603050405020304" pitchFamily="18" charset="0"/>
+              </a:rPr>
+              <a:t>Grafana</a:t>
+            </a:r>
+            <a:r>
+              <a:rPr lang="en-US" dirty="0">
+                <a:latin typeface="Times New Roman" panose="02020603050405020304" pitchFamily="18" charset="0"/>
+                <a:cs typeface="Times New Roman" panose="02020603050405020304" pitchFamily="18" charset="0"/>
+              </a:rPr>
+              <a:t> dashboard for real-time and historical stock data visualization.</a:t>
+            </a:r>
+          </a:p>
+          <a:p>
+            <a:pPr algn="just">
               <a:buFont typeface="+mj-lt"/>
               <a:buAutoNum type="arabicPeriod"/>
             </a:pPr>
             <a:r>
-              <a:rPr lang="en-US" sz="2200" b="1" dirty="0">
-                <a:solidFill>
-                  <a:schemeClr val="tx2"/>
-                </a:solidFill>
+              <a:rPr lang="en-US" b="1" dirty="0">
                 <a:latin typeface="Times New Roman" panose="02020603050405020304" pitchFamily="18" charset="0"/>
                 <a:cs typeface="Times New Roman" panose="02020603050405020304" pitchFamily="18" charset="0"/>
               </a:rPr>
-              <a:t>Adj Close: </a:t>
-            </a:r>
-            <a:r>
-              <a:rPr lang="en-US" sz="2200" dirty="0">
-                <a:solidFill>
-                  <a:schemeClr val="tx2"/>
-                </a:solidFill>
+              <a:t>Scalability</a:t>
+            </a:r>
+            <a:r>
+              <a:rPr lang="en-US" dirty="0">
                 <a:latin typeface="Times New Roman" panose="02020603050405020304" pitchFamily="18" charset="0"/>
                 <a:cs typeface="Times New Roman" panose="02020603050405020304" pitchFamily="18" charset="0"/>
               </a:rPr>
-              <a:t>Adjusted closing price considering factors like dividends.</a:t>
-            </a:r>
-          </a:p>
-          <a:p>
-            <a:pPr marL="914400" lvl="1" indent="-457200" algn="just">
-              <a:buFont typeface="+mj-lt"/>
-              <a:buAutoNum type="arabicPeriod"/>
-            </a:pPr>
-            <a:r>
-              <a:rPr lang="en-US" sz="2200" b="1" dirty="0">
-                <a:solidFill>
-                  <a:schemeClr val="tx2"/>
-                </a:solidFill>
-                <a:latin typeface="Times New Roman" panose="02020603050405020304" pitchFamily="18" charset="0"/>
-                <a:cs typeface="Times New Roman" panose="02020603050405020304" pitchFamily="18" charset="0"/>
-              </a:rPr>
-              <a:t>Volume: </a:t>
-            </a:r>
-            <a:r>
-              <a:rPr lang="en-US" sz="2200" dirty="0">
-                <a:solidFill>
-                  <a:schemeClr val="tx2"/>
-                </a:solidFill>
-                <a:latin typeface="Times New Roman" panose="02020603050405020304" pitchFamily="18" charset="0"/>
-                <a:cs typeface="Times New Roman" panose="02020603050405020304" pitchFamily="18" charset="0"/>
-              </a:rPr>
-              <a:t>The number of shares traded during that day.</a:t>
-            </a:r>
-          </a:p>
-          <a:p>
-            <a:pPr marL="457200" indent="-457200" algn="just">
-              <a:buFont typeface="+mj-lt"/>
-              <a:buAutoNum type="arabicPeriod"/>
-            </a:pPr>
-            <a:r>
-              <a:rPr lang="en-US" sz="2200" b="1" dirty="0">
-                <a:solidFill>
-                  <a:schemeClr val="tx2"/>
-                </a:solidFill>
-                <a:latin typeface="Times New Roman" panose="02020603050405020304" pitchFamily="18" charset="0"/>
-                <a:cs typeface="Times New Roman" panose="02020603050405020304" pitchFamily="18" charset="0"/>
-              </a:rPr>
-              <a:t>Data Preprocessing</a:t>
-            </a:r>
-            <a:r>
-              <a:rPr lang="en-US" sz="2200" dirty="0">
-                <a:solidFill>
-                  <a:schemeClr val="tx2"/>
-                </a:solidFill>
-                <a:latin typeface="Times New Roman" panose="02020603050405020304" pitchFamily="18" charset="0"/>
-                <a:cs typeface="Times New Roman" panose="02020603050405020304" pitchFamily="18" charset="0"/>
-              </a:rPr>
-              <a:t>: All preprocessing tasks have been completed. We removed missing values as they were minimal and insignificant to the analysis. An extensive </a:t>
-            </a:r>
-            <a:r>
-              <a:rPr lang="en-US" sz="2200" b="1" dirty="0">
-                <a:solidFill>
-                  <a:schemeClr val="tx2"/>
-                </a:solidFill>
-                <a:latin typeface="Times New Roman" panose="02020603050405020304" pitchFamily="18" charset="0"/>
-                <a:cs typeface="Times New Roman" panose="02020603050405020304" pitchFamily="18" charset="0"/>
-              </a:rPr>
-              <a:t>EDA</a:t>
-            </a:r>
-            <a:r>
-              <a:rPr lang="en-US" sz="2200" dirty="0">
-                <a:solidFill>
-                  <a:schemeClr val="tx2"/>
-                </a:solidFill>
-                <a:latin typeface="Times New Roman" panose="02020603050405020304" pitchFamily="18" charset="0"/>
-                <a:cs typeface="Times New Roman" panose="02020603050405020304" pitchFamily="18" charset="0"/>
-              </a:rPr>
-              <a:t> was conducted, confirming the absence of outliers, making the dataset reliable for model training.</a:t>
+              <a:t>: Ensuring the system is scalable for future expansions, both in terms of larger datasets and more complex models.</a:t>
             </a:r>
           </a:p>
         </p:txBody>
@@ -6045,7 +6062,7 @@
           <p:cNvPr id="4" name="Date Placeholder 3">
             <a:extLst>
               <a:ext uri="{FF2B5EF4-FFF2-40B4-BE49-F238E27FC236}">
-                <a16:creationId xmlns:a16="http://schemas.microsoft.com/office/drawing/2014/main" id="{778EEA4E-C912-B01D-E6EF-A496EA617F13}"/>
+                <a16:creationId xmlns:a16="http://schemas.microsoft.com/office/drawing/2014/main" id="{9A3B0F8D-0096-90FF-58FB-A329F382A148}"/>
               </a:ext>
             </a:extLst>
           </p:cNvPr>
@@ -6063,7 +6080,7 @@
           <a:p>
             <a:fld id="{3E200D22-A913-914D-B06C-E294256DAC47}" type="datetime1">
               <a:rPr lang="en-IN" smtClean="0"/>
-              <a:t>03-10-2024</a:t>
+              <a:t>04-10-2024</a:t>
             </a:fld>
             <a:endParaRPr lang="en-US"/>
           </a:p>
@@ -6074,7 +6091,7 @@
           <p:cNvPr id="5" name="Slide Number Placeholder 4">
             <a:extLst>
               <a:ext uri="{FF2B5EF4-FFF2-40B4-BE49-F238E27FC236}">
-                <a16:creationId xmlns:a16="http://schemas.microsoft.com/office/drawing/2014/main" id="{CDD46A77-5BC6-403C-C3E4-E790B8E5E677}"/>
+                <a16:creationId xmlns:a16="http://schemas.microsoft.com/office/drawing/2014/main" id="{613503A7-DC42-3131-B40B-E4E4975A6E34}"/>
               </a:ext>
             </a:extLst>
           </p:cNvPr>
@@ -6101,7 +6118,7 @@
     </p:spTree>
     <p:extLst>
       <p:ext uri="{BB962C8B-B14F-4D97-AF65-F5344CB8AC3E}">
-        <p14:creationId xmlns:p14="http://schemas.microsoft.com/office/powerpoint/2010/main" val="3285246515"/>
+        <p14:creationId xmlns:p14="http://schemas.microsoft.com/office/powerpoint/2010/main" val="1684016132"/>
       </p:ext>
     </p:extLst>
   </p:cSld>
@@ -6133,7 +6150,7 @@
           <p:cNvPr id="2" name="Title 1">
             <a:extLst>
               <a:ext uri="{FF2B5EF4-FFF2-40B4-BE49-F238E27FC236}">
-                <a16:creationId xmlns:a16="http://schemas.microsoft.com/office/drawing/2014/main" id="{B7E2AA4F-CBD6-3A0A-3ED7-936E5032272B}"/>
+                <a16:creationId xmlns:a16="http://schemas.microsoft.com/office/drawing/2014/main" id="{2ABC3314-BFBE-2297-4F63-0EA2A01F9ECC}"/>
               </a:ext>
             </a:extLst>
           </p:cNvPr>
@@ -6153,7 +6170,6 @@
               <a:rPr lang="en-US" dirty="0"/>
               <a:t>Progress So far</a:t>
             </a:r>
-            <a:endParaRPr lang="en-IN" dirty="0"/>
           </a:p>
         </p:txBody>
       </p:sp>
@@ -6162,7 +6178,7 @@
           <p:cNvPr id="3" name="Content Placeholder 2">
             <a:extLst>
               <a:ext uri="{FF2B5EF4-FFF2-40B4-BE49-F238E27FC236}">
-                <a16:creationId xmlns:a16="http://schemas.microsoft.com/office/drawing/2014/main" id="{4FF73FCE-4553-27BD-B5BB-D568C4E2E65B}"/>
+                <a16:creationId xmlns:a16="http://schemas.microsoft.com/office/drawing/2014/main" id="{01E66CA6-E107-EA0A-DE24-B00CED43A879}"/>
               </a:ext>
             </a:extLst>
           </p:cNvPr>
@@ -6176,13 +6192,13 @@
         <p:spPr/>
         <p:txBody>
           <a:bodyPr>
-            <a:normAutofit/>
+            <a:noAutofit/>
           </a:bodyPr>
           <a:lstStyle/>
           <a:p>
             <a:pPr marL="457200" indent="-457200" algn="just">
               <a:buFont typeface="+mj-lt"/>
-              <a:buAutoNum type="arabicPeriod" startAt="3"/>
+              <a:buAutoNum type="arabicPeriod"/>
             </a:pPr>
             <a:r>
               <a:rPr lang="en-US" sz="2200" b="1" dirty="0">
@@ -6192,7 +6208,7 @@
                 <a:latin typeface="Times New Roman" panose="02020603050405020304" pitchFamily="18" charset="0"/>
                 <a:cs typeface="Times New Roman" panose="02020603050405020304" pitchFamily="18" charset="0"/>
               </a:rPr>
-              <a:t>Next Steps</a:t>
+              <a:t>Dataset Analysis and Selection</a:t>
             </a:r>
             <a:r>
               <a:rPr lang="en-US" sz="2200" dirty="0">
@@ -6202,7 +6218,7 @@
                 <a:latin typeface="Times New Roman" panose="02020603050405020304" pitchFamily="18" charset="0"/>
                 <a:cs typeface="Times New Roman" panose="02020603050405020304" pitchFamily="18" charset="0"/>
               </a:rPr>
-              <a:t>: Moving forward, we may conduct additional preprocessing based on model requirements. The </a:t>
+              <a:t>: We have analyzed multiple available datasets and finalized two key datasets—</a:t>
             </a:r>
             <a:r>
               <a:rPr lang="en-US" sz="2200" b="1" dirty="0">
@@ -6212,7 +6228,7 @@
                 <a:latin typeface="Times New Roman" panose="02020603050405020304" pitchFamily="18" charset="0"/>
                 <a:cs typeface="Times New Roman" panose="02020603050405020304" pitchFamily="18" charset="0"/>
               </a:rPr>
-              <a:t>Date</a:t>
+              <a:t>TCS</a:t>
             </a:r>
             <a:r>
               <a:rPr lang="en-US" sz="2200" dirty="0">
@@ -6222,45 +6238,178 @@
                 <a:latin typeface="Times New Roman" panose="02020603050405020304" pitchFamily="18" charset="0"/>
                 <a:cs typeface="Times New Roman" panose="02020603050405020304" pitchFamily="18" charset="0"/>
               </a:rPr>
-              <a:t> column will be set as the index, and we will generate visualizations to show the dataset distribution and trends.</a:t>
+              <a:t> and </a:t>
+            </a:r>
+            <a:r>
+              <a:rPr lang="en-US" sz="2200" b="1" dirty="0">
+                <a:solidFill>
+                  <a:schemeClr val="tx2"/>
+                </a:solidFill>
+                <a:latin typeface="Times New Roman" panose="02020603050405020304" pitchFamily="18" charset="0"/>
+                <a:cs typeface="Times New Roman" panose="02020603050405020304" pitchFamily="18" charset="0"/>
+              </a:rPr>
+              <a:t>Google</a:t>
+            </a:r>
+            <a:r>
+              <a:rPr lang="en-US" sz="2200" dirty="0">
+                <a:solidFill>
+                  <a:schemeClr val="tx2"/>
+                </a:solidFill>
+                <a:latin typeface="Times New Roman" panose="02020603050405020304" pitchFamily="18" charset="0"/>
+                <a:cs typeface="Times New Roman" panose="02020603050405020304" pitchFamily="18" charset="0"/>
+              </a:rPr>
+              <a:t>—for training our model. These datasets contain stock-related columns such as:</a:t>
+            </a:r>
+          </a:p>
+          <a:p>
+            <a:pPr marL="914400" lvl="1" indent="-457200" algn="just">
+              <a:buFont typeface="+mj-lt"/>
+              <a:buAutoNum type="arabicPeriod"/>
+            </a:pPr>
+            <a:r>
+              <a:rPr lang="en-US" sz="2200" b="1" dirty="0">
+                <a:solidFill>
+                  <a:schemeClr val="tx2"/>
+                </a:solidFill>
+                <a:latin typeface="Times New Roman" panose="02020603050405020304" pitchFamily="18" charset="0"/>
+                <a:cs typeface="Times New Roman" panose="02020603050405020304" pitchFamily="18" charset="0"/>
+              </a:rPr>
+              <a:t>Date</a:t>
+            </a:r>
+            <a:r>
+              <a:rPr lang="en-US" sz="2200" dirty="0">
+                <a:solidFill>
+                  <a:schemeClr val="tx2"/>
+                </a:solidFill>
+                <a:latin typeface="Times New Roman" panose="02020603050405020304" pitchFamily="18" charset="0"/>
+                <a:cs typeface="Times New Roman" panose="02020603050405020304" pitchFamily="18" charset="0"/>
+              </a:rPr>
+              <a:t>: The trading date (to be used as the index).</a:t>
+            </a:r>
+          </a:p>
+          <a:p>
+            <a:pPr marL="914400" lvl="1" indent="-457200" algn="just">
+              <a:buFont typeface="+mj-lt"/>
+              <a:buAutoNum type="arabicPeriod"/>
+            </a:pPr>
+            <a:r>
+              <a:rPr lang="en-US" sz="2200" b="1" dirty="0">
+                <a:solidFill>
+                  <a:schemeClr val="tx2"/>
+                </a:solidFill>
+                <a:latin typeface="Times New Roman" panose="02020603050405020304" pitchFamily="18" charset="0"/>
+                <a:cs typeface="Times New Roman" panose="02020603050405020304" pitchFamily="18" charset="0"/>
+              </a:rPr>
+              <a:t>Open, High, Low, Close: </a:t>
+            </a:r>
+            <a:r>
+              <a:rPr lang="en-US" sz="2200" dirty="0">
+                <a:solidFill>
+                  <a:schemeClr val="tx2"/>
+                </a:solidFill>
+                <a:latin typeface="Times New Roman" panose="02020603050405020304" pitchFamily="18" charset="0"/>
+                <a:cs typeface="Times New Roman" panose="02020603050405020304" pitchFamily="18" charset="0"/>
+              </a:rPr>
+              <a:t>The stock prices at the opening, highest, lowest, and closing times of the day.</a:t>
+            </a:r>
+          </a:p>
+          <a:p>
+            <a:pPr marL="914400" lvl="1" indent="-457200" algn="just">
+              <a:buFont typeface="+mj-lt"/>
+              <a:buAutoNum type="arabicPeriod"/>
+            </a:pPr>
+            <a:r>
+              <a:rPr lang="en-US" sz="2200" b="1" dirty="0">
+                <a:solidFill>
+                  <a:schemeClr val="tx2"/>
+                </a:solidFill>
+                <a:latin typeface="Times New Roman" panose="02020603050405020304" pitchFamily="18" charset="0"/>
+                <a:cs typeface="Times New Roman" panose="02020603050405020304" pitchFamily="18" charset="0"/>
+              </a:rPr>
+              <a:t>Adj Close: </a:t>
+            </a:r>
+            <a:r>
+              <a:rPr lang="en-US" sz="2200" dirty="0">
+                <a:solidFill>
+                  <a:schemeClr val="tx2"/>
+                </a:solidFill>
+                <a:latin typeface="Times New Roman" panose="02020603050405020304" pitchFamily="18" charset="0"/>
+                <a:cs typeface="Times New Roman" panose="02020603050405020304" pitchFamily="18" charset="0"/>
+              </a:rPr>
+              <a:t>Adjusted closing price considering factors like dividends.</a:t>
+            </a:r>
+          </a:p>
+          <a:p>
+            <a:pPr marL="914400" lvl="1" indent="-457200" algn="just">
+              <a:buFont typeface="+mj-lt"/>
+              <a:buAutoNum type="arabicPeriod"/>
+            </a:pPr>
+            <a:r>
+              <a:rPr lang="en-US" sz="2200" b="1" dirty="0">
+                <a:solidFill>
+                  <a:schemeClr val="tx2"/>
+                </a:solidFill>
+                <a:latin typeface="Times New Roman" panose="02020603050405020304" pitchFamily="18" charset="0"/>
+                <a:cs typeface="Times New Roman" panose="02020603050405020304" pitchFamily="18" charset="0"/>
+              </a:rPr>
+              <a:t>Volume: </a:t>
+            </a:r>
+            <a:r>
+              <a:rPr lang="en-US" sz="2200" dirty="0">
+                <a:solidFill>
+                  <a:schemeClr val="tx2"/>
+                </a:solidFill>
+                <a:latin typeface="Times New Roman" panose="02020603050405020304" pitchFamily="18" charset="0"/>
+                <a:cs typeface="Times New Roman" panose="02020603050405020304" pitchFamily="18" charset="0"/>
+              </a:rPr>
+              <a:t>The number of shares traded during that day.</a:t>
             </a:r>
           </a:p>
           <a:p>
             <a:pPr marL="457200" indent="-457200" algn="just">
               <a:buFont typeface="+mj-lt"/>
-              <a:buAutoNum type="arabicPeriod" startAt="3"/>
+              <a:buAutoNum type="arabicPeriod"/>
             </a:pPr>
             <a:r>
               <a:rPr lang="en-US" sz="2200" b="1" dirty="0">
+                <a:solidFill>
+                  <a:schemeClr val="tx2"/>
+                </a:solidFill>
                 <a:latin typeface="Times New Roman" panose="02020603050405020304" pitchFamily="18" charset="0"/>
                 <a:cs typeface="Times New Roman" panose="02020603050405020304" pitchFamily="18" charset="0"/>
               </a:rPr>
-              <a:t>Model Training and Evaluation: </a:t>
+              <a:t>Data Preprocessing</a:t>
             </a:r>
             <a:r>
               <a:rPr lang="en-US" sz="2200" dirty="0">
+                <a:solidFill>
+                  <a:schemeClr val="tx2"/>
+                </a:solidFill>
                 <a:latin typeface="Times New Roman" panose="02020603050405020304" pitchFamily="18" charset="0"/>
                 <a:cs typeface="Times New Roman" panose="02020603050405020304" pitchFamily="18" charset="0"/>
               </a:rPr>
-              <a:t>The model has been trained on the dataset. Next, we will evaluate its performance by analyzing key metrics like accuracy, precision, recall, and other relevant parameters to assess its effectiveness in predicting stock prices.</a:t>
-            </a:r>
-            <a:endParaRPr lang="en-US" sz="2200" dirty="0">
-              <a:solidFill>
-                <a:schemeClr val="tx2"/>
-              </a:solidFill>
-              <a:latin typeface="Times New Roman" panose="02020603050405020304" pitchFamily="18" charset="0"/>
-              <a:cs typeface="Times New Roman" panose="02020603050405020304" pitchFamily="18" charset="0"/>
-            </a:endParaRPr>
-          </a:p>
-          <a:p>
-            <a:pPr marL="457200" indent="-457200" algn="just">
-              <a:buFont typeface="+mj-lt"/>
-              <a:buAutoNum type="arabicPeriod" startAt="3"/>
-            </a:pPr>
-            <a:endParaRPr lang="en-IN" sz="2200" dirty="0">
-              <a:latin typeface="Times New Roman" panose="02020603050405020304" pitchFamily="18" charset="0"/>
-              <a:cs typeface="Times New Roman" panose="02020603050405020304" pitchFamily="18" charset="0"/>
-            </a:endParaRPr>
+              <a:t>: All preprocessing tasks have been completed. We removed missing values as they were minimal and insignificant to the analysis. An extensive </a:t>
+            </a:r>
+            <a:r>
+              <a:rPr lang="en-US" sz="2200" b="1" dirty="0">
+                <a:solidFill>
+                  <a:schemeClr val="tx2"/>
+                </a:solidFill>
+                <a:latin typeface="Times New Roman" panose="02020603050405020304" pitchFamily="18" charset="0"/>
+                <a:cs typeface="Times New Roman" panose="02020603050405020304" pitchFamily="18" charset="0"/>
+              </a:rPr>
+              <a:t>EDA</a:t>
+            </a:r>
+            <a:r>
+              <a:rPr lang="en-US" sz="2200" dirty="0">
+                <a:solidFill>
+                  <a:schemeClr val="tx2"/>
+                </a:solidFill>
+                <a:latin typeface="Times New Roman" panose="02020603050405020304" pitchFamily="18" charset="0"/>
+                <a:cs typeface="Times New Roman" panose="02020603050405020304" pitchFamily="18" charset="0"/>
+              </a:rPr>
+              <a:t> was conducted, confirming the absence of outliers, making the dataset reliable for model training.</a:t>
+            </a:r>
           </a:p>
         </p:txBody>
       </p:sp>
@@ -6269,7 +6418,7 @@
           <p:cNvPr id="4" name="Date Placeholder 3">
             <a:extLst>
               <a:ext uri="{FF2B5EF4-FFF2-40B4-BE49-F238E27FC236}">
-                <a16:creationId xmlns:a16="http://schemas.microsoft.com/office/drawing/2014/main" id="{1FB7B9A1-3D65-97BD-E6B0-9E6AA8814191}"/>
+                <a16:creationId xmlns:a16="http://schemas.microsoft.com/office/drawing/2014/main" id="{778EEA4E-C912-B01D-E6EF-A496EA617F13}"/>
               </a:ext>
             </a:extLst>
           </p:cNvPr>
@@ -6287,7 +6436,7 @@
           <a:p>
             <a:fld id="{3E200D22-A913-914D-B06C-E294256DAC47}" type="datetime1">
               <a:rPr lang="en-IN" smtClean="0"/>
-              <a:t>03-10-2024</a:t>
+              <a:t>04-10-2024</a:t>
             </a:fld>
             <a:endParaRPr lang="en-US"/>
           </a:p>
@@ -6298,7 +6447,7 @@
           <p:cNvPr id="5" name="Slide Number Placeholder 4">
             <a:extLst>
               <a:ext uri="{FF2B5EF4-FFF2-40B4-BE49-F238E27FC236}">
-                <a16:creationId xmlns:a16="http://schemas.microsoft.com/office/drawing/2014/main" id="{41AB5356-35D6-A787-4E38-DF419749C7D6}"/>
+                <a16:creationId xmlns:a16="http://schemas.microsoft.com/office/drawing/2014/main" id="{CDD46A77-5BC6-403C-C3E4-E790B8E5E677}"/>
               </a:ext>
             </a:extLst>
           </p:cNvPr>
@@ -6325,7 +6474,7 @@
     </p:spTree>
     <p:extLst>
       <p:ext uri="{BB962C8B-B14F-4D97-AF65-F5344CB8AC3E}">
-        <p14:creationId xmlns:p14="http://schemas.microsoft.com/office/powerpoint/2010/main" val="100956237"/>
+        <p14:creationId xmlns:p14="http://schemas.microsoft.com/office/powerpoint/2010/main" val="3285246515"/>
       </p:ext>
     </p:extLst>
   </p:cSld>
@@ -6357,7 +6506,7 @@
           <p:cNvPr id="2" name="Title 1">
             <a:extLst>
               <a:ext uri="{FF2B5EF4-FFF2-40B4-BE49-F238E27FC236}">
-                <a16:creationId xmlns:a16="http://schemas.microsoft.com/office/drawing/2014/main" id="{9F789A05-4476-53DB-7FC2-106461248B9C}"/>
+                <a16:creationId xmlns:a16="http://schemas.microsoft.com/office/drawing/2014/main" id="{B7E2AA4F-CBD6-3A0A-3ED7-936E5032272B}"/>
               </a:ext>
             </a:extLst>
           </p:cNvPr>
@@ -6375,9 +6524,116 @@
           <a:p>
             <a:r>
               <a:rPr lang="en-US" dirty="0"/>
-              <a:t>Dataset Visualization</a:t>
+              <a:t>Progress So far</a:t>
             </a:r>
             <a:endParaRPr lang="en-IN" dirty="0"/>
+          </a:p>
+        </p:txBody>
+      </p:sp>
+      <p:sp>
+        <p:nvSpPr>
+          <p:cNvPr id="3" name="Content Placeholder 2">
+            <a:extLst>
+              <a:ext uri="{FF2B5EF4-FFF2-40B4-BE49-F238E27FC236}">
+                <a16:creationId xmlns:a16="http://schemas.microsoft.com/office/drawing/2014/main" id="{4FF73FCE-4553-27BD-B5BB-D568C4E2E65B}"/>
+              </a:ext>
+            </a:extLst>
+          </p:cNvPr>
+          <p:cNvSpPr>
+            <a:spLocks noGrp="1"/>
+          </p:cNvSpPr>
+          <p:nvPr>
+            <p:ph idx="1"/>
+          </p:nvPr>
+        </p:nvSpPr>
+        <p:spPr/>
+        <p:txBody>
+          <a:bodyPr>
+            <a:normAutofit/>
+          </a:bodyPr>
+          <a:lstStyle/>
+          <a:p>
+            <a:pPr marL="457200" indent="-457200" algn="just">
+              <a:buFont typeface="+mj-lt"/>
+              <a:buAutoNum type="arabicPeriod" startAt="3"/>
+            </a:pPr>
+            <a:r>
+              <a:rPr lang="en-US" sz="2200" b="1" dirty="0">
+                <a:solidFill>
+                  <a:schemeClr val="tx2"/>
+                </a:solidFill>
+                <a:latin typeface="Times New Roman" panose="02020603050405020304" pitchFamily="18" charset="0"/>
+                <a:cs typeface="Times New Roman" panose="02020603050405020304" pitchFamily="18" charset="0"/>
+              </a:rPr>
+              <a:t>Next Steps</a:t>
+            </a:r>
+            <a:r>
+              <a:rPr lang="en-US" sz="2200" dirty="0">
+                <a:solidFill>
+                  <a:schemeClr val="tx2"/>
+                </a:solidFill>
+                <a:latin typeface="Times New Roman" panose="02020603050405020304" pitchFamily="18" charset="0"/>
+                <a:cs typeface="Times New Roman" panose="02020603050405020304" pitchFamily="18" charset="0"/>
+              </a:rPr>
+              <a:t>: Moving forward, we may conduct additional preprocessing based on model requirements. The </a:t>
+            </a:r>
+            <a:r>
+              <a:rPr lang="en-US" sz="2200" b="1" dirty="0">
+                <a:solidFill>
+                  <a:schemeClr val="tx2"/>
+                </a:solidFill>
+                <a:latin typeface="Times New Roman" panose="02020603050405020304" pitchFamily="18" charset="0"/>
+                <a:cs typeface="Times New Roman" panose="02020603050405020304" pitchFamily="18" charset="0"/>
+              </a:rPr>
+              <a:t>Date</a:t>
+            </a:r>
+            <a:r>
+              <a:rPr lang="en-US" sz="2200" dirty="0">
+                <a:solidFill>
+                  <a:schemeClr val="tx2"/>
+                </a:solidFill>
+                <a:latin typeface="Times New Roman" panose="02020603050405020304" pitchFamily="18" charset="0"/>
+                <a:cs typeface="Times New Roman" panose="02020603050405020304" pitchFamily="18" charset="0"/>
+              </a:rPr>
+              <a:t> column will be set as the index, and we will generate visualizations to show the dataset distribution and trends.</a:t>
+            </a:r>
+          </a:p>
+          <a:p>
+            <a:pPr marL="457200" indent="-457200" algn="just">
+              <a:buFont typeface="+mj-lt"/>
+              <a:buAutoNum type="arabicPeriod" startAt="3"/>
+            </a:pPr>
+            <a:r>
+              <a:rPr lang="en-US" sz="2200" b="1" dirty="0">
+                <a:latin typeface="Times New Roman" panose="02020603050405020304" pitchFamily="18" charset="0"/>
+                <a:cs typeface="Times New Roman" panose="02020603050405020304" pitchFamily="18" charset="0"/>
+              </a:rPr>
+              <a:t>Model Training and Evaluation: </a:t>
+            </a:r>
+            <a:r>
+              <a:rPr lang="en-US" sz="2200" dirty="0">
+                <a:latin typeface="Times New Roman" panose="02020603050405020304" pitchFamily="18" charset="0"/>
+                <a:cs typeface="Times New Roman" panose="02020603050405020304" pitchFamily="18" charset="0"/>
+              </a:rPr>
+              <a:t>The model has been trained on the dataset. Next, we will evaluate its performance by analyzing key metrics like accuracy, precision, recall, and other relevant parameters to assess its effectiveness in predicting stock prices.</a:t>
+            </a:r>
+            <a:endParaRPr lang="en-US" sz="2200" dirty="0">
+              <a:solidFill>
+                <a:schemeClr val="tx2"/>
+              </a:solidFill>
+              <a:latin typeface="Times New Roman" panose="02020603050405020304" pitchFamily="18" charset="0"/>
+              <a:cs typeface="Times New Roman" panose="02020603050405020304" pitchFamily="18" charset="0"/>
+            </a:endParaRPr>
+          </a:p>
+          <a:p>
+            <a:pPr marL="457200" indent="-457200" algn="just">
+              <a:buFont typeface="+mj-lt"/>
+              <a:buAutoNum type="arabicPeriod" startAt="3"/>
+            </a:pPr>
+            <a:endParaRPr lang="en-IN" sz="2200" dirty="0">
+              <a:latin typeface="Times New Roman" panose="02020603050405020304" pitchFamily="18" charset="0"/>
+              <a:cs typeface="Times New Roman" panose="02020603050405020304" pitchFamily="18" charset="0"/>
+            </a:endParaRPr>
           </a:p>
         </p:txBody>
       </p:sp>
@@ -6386,7 +6642,7 @@
           <p:cNvPr id="4" name="Date Placeholder 3">
             <a:extLst>
               <a:ext uri="{FF2B5EF4-FFF2-40B4-BE49-F238E27FC236}">
-                <a16:creationId xmlns:a16="http://schemas.microsoft.com/office/drawing/2014/main" id="{2C111C92-3DD7-C4B4-3752-5CA950F1A653}"/>
+                <a16:creationId xmlns:a16="http://schemas.microsoft.com/office/drawing/2014/main" id="{1FB7B9A1-3D65-97BD-E6B0-9E6AA8814191}"/>
               </a:ext>
             </a:extLst>
           </p:cNvPr>
@@ -6404,7 +6660,7 @@
           <a:p>
             <a:fld id="{3E200D22-A913-914D-B06C-E294256DAC47}" type="datetime1">
               <a:rPr lang="en-IN" smtClean="0"/>
-              <a:t>03-10-2024</a:t>
+              <a:t>04-10-2024</a:t>
             </a:fld>
             <a:endParaRPr lang="en-US"/>
           </a:p>
@@ -6415,7 +6671,7 @@
           <p:cNvPr id="5" name="Slide Number Placeholder 4">
             <a:extLst>
               <a:ext uri="{FF2B5EF4-FFF2-40B4-BE49-F238E27FC236}">
-                <a16:creationId xmlns:a16="http://schemas.microsoft.com/office/drawing/2014/main" id="{3A800CE5-C1DA-A7E9-8780-2D76317F04EC}"/>
+                <a16:creationId xmlns:a16="http://schemas.microsoft.com/office/drawing/2014/main" id="{41AB5356-35D6-A787-4E38-DF419749C7D6}"/>
               </a:ext>
             </a:extLst>
           </p:cNvPr>
@@ -6434,6 +6690,123 @@
             <a:fld id="{84D618AA-8DAA-FF4E-B18D-27A1BA1C0151}" type="slidenum">
               <a:rPr lang="en-US" smtClean="0"/>
               <a:t>13</a:t>
+            </a:fld>
+            <a:endParaRPr lang="en-US"/>
+          </a:p>
+        </p:txBody>
+      </p:sp>
+    </p:spTree>
+    <p:extLst>
+      <p:ext uri="{BB962C8B-B14F-4D97-AF65-F5344CB8AC3E}">
+        <p14:creationId xmlns:p14="http://schemas.microsoft.com/office/powerpoint/2010/main" val="100956237"/>
+      </p:ext>
+    </p:extLst>
+  </p:cSld>
+  <p:clrMapOvr>
+    <a:masterClrMapping/>
+  </p:clrMapOvr>
+</p:sld>
+</file>
+
+<file path=ppt/slides/slide14.xml><?xml version="1.0" encoding="utf-8"?>
+<p:sld xmlns:a="http://schemas.openxmlformats.org/drawingml/2006/main" xmlns:r="http://schemas.openxmlformats.org/officeDocument/2006/relationships" xmlns:p="http://schemas.openxmlformats.org/presentationml/2006/main">
+  <p:cSld>
+    <p:spTree>
+      <p:nvGrpSpPr>
+        <p:cNvPr id="1" name=""/>
+        <p:cNvGrpSpPr/>
+        <p:nvPr/>
+      </p:nvGrpSpPr>
+      <p:grpSpPr>
+        <a:xfrm>
+          <a:off x="0" y="0"/>
+          <a:ext cx="0" cy="0"/>
+          <a:chOff x="0" y="0"/>
+          <a:chExt cx="0" cy="0"/>
+        </a:xfrm>
+      </p:grpSpPr>
+      <p:sp>
+        <p:nvSpPr>
+          <p:cNvPr id="2" name="Title 1">
+            <a:extLst>
+              <a:ext uri="{FF2B5EF4-FFF2-40B4-BE49-F238E27FC236}">
+                <a16:creationId xmlns:a16="http://schemas.microsoft.com/office/drawing/2014/main" id="{9F789A05-4476-53DB-7FC2-106461248B9C}"/>
+              </a:ext>
+            </a:extLst>
+          </p:cNvPr>
+          <p:cNvSpPr>
+            <a:spLocks noGrp="1"/>
+          </p:cNvSpPr>
+          <p:nvPr>
+            <p:ph type="title"/>
+          </p:nvPr>
+        </p:nvSpPr>
+        <p:spPr/>
+        <p:txBody>
+          <a:bodyPr/>
+          <a:lstStyle/>
+          <a:p>
+            <a:r>
+              <a:rPr lang="en-US" dirty="0"/>
+              <a:t>Dataset Visualization</a:t>
+            </a:r>
+            <a:endParaRPr lang="en-IN" dirty="0"/>
+          </a:p>
+        </p:txBody>
+      </p:sp>
+      <p:sp>
+        <p:nvSpPr>
+          <p:cNvPr id="4" name="Date Placeholder 3">
+            <a:extLst>
+              <a:ext uri="{FF2B5EF4-FFF2-40B4-BE49-F238E27FC236}">
+                <a16:creationId xmlns:a16="http://schemas.microsoft.com/office/drawing/2014/main" id="{2C111C92-3DD7-C4B4-3752-5CA950F1A653}"/>
+              </a:ext>
+            </a:extLst>
+          </p:cNvPr>
+          <p:cNvSpPr>
+            <a:spLocks noGrp="1"/>
+          </p:cNvSpPr>
+          <p:nvPr>
+            <p:ph type="dt" sz="half" idx="10"/>
+          </p:nvPr>
+        </p:nvSpPr>
+        <p:spPr/>
+        <p:txBody>
+          <a:bodyPr/>
+          <a:lstStyle/>
+          <a:p>
+            <a:fld id="{3E200D22-A913-914D-B06C-E294256DAC47}" type="datetime1">
+              <a:rPr lang="en-IN" smtClean="0"/>
+              <a:t>04-10-2024</a:t>
+            </a:fld>
+            <a:endParaRPr lang="en-US"/>
+          </a:p>
+        </p:txBody>
+      </p:sp>
+      <p:sp>
+        <p:nvSpPr>
+          <p:cNvPr id="5" name="Slide Number Placeholder 4">
+            <a:extLst>
+              <a:ext uri="{FF2B5EF4-FFF2-40B4-BE49-F238E27FC236}">
+                <a16:creationId xmlns:a16="http://schemas.microsoft.com/office/drawing/2014/main" id="{3A800CE5-C1DA-A7E9-8780-2D76317F04EC}"/>
+              </a:ext>
+            </a:extLst>
+          </p:cNvPr>
+          <p:cNvSpPr>
+            <a:spLocks noGrp="1"/>
+          </p:cNvSpPr>
+          <p:nvPr>
+            <p:ph type="sldNum" sz="quarter" idx="12"/>
+          </p:nvPr>
+        </p:nvSpPr>
+        <p:spPr/>
+        <p:txBody>
+          <a:bodyPr/>
+          <a:lstStyle/>
+          <a:p>
+            <a:fld id="{84D618AA-8DAA-FF4E-B18D-27A1BA1C0151}" type="slidenum">
+              <a:rPr lang="en-US" smtClean="0"/>
+              <a:t>14</a:t>
             </a:fld>
             <a:endParaRPr lang="en-US"/>
           </a:p>
@@ -6640,7 +7013,7 @@
 </p:sld>
 </file>
 
-<file path=ppt/slides/slide14.xml><?xml version="1.0" encoding="utf-8"?>
+<file path=ppt/slides/slide15.xml><?xml version="1.0" encoding="utf-8"?>
 <p:sld xmlns:a="http://schemas.openxmlformats.org/drawingml/2006/main" xmlns:r="http://schemas.openxmlformats.org/officeDocument/2006/relationships" xmlns:p="http://schemas.openxmlformats.org/presentationml/2006/main">
   <p:cSld>
     <p:spTree>
@@ -6709,7 +7082,7 @@
           <a:p>
             <a:fld id="{3E200D22-A913-914D-B06C-E294256DAC47}" type="datetime1">
               <a:rPr lang="en-IN" smtClean="0"/>
-              <a:t>03-10-2024</a:t>
+              <a:t>04-10-2024</a:t>
             </a:fld>
             <a:endParaRPr lang="en-US"/>
           </a:p>
@@ -6738,7 +7111,7 @@
           <a:p>
             <a:fld id="{84D618AA-8DAA-FF4E-B18D-27A1BA1C0151}" type="slidenum">
               <a:rPr lang="en-US" smtClean="0"/>
-              <a:t>14</a:t>
+              <a:t>15</a:t>
             </a:fld>
             <a:endParaRPr lang="en-US"/>
           </a:p>
@@ -6804,7 +7177,7 @@
 </p:sld>
 </file>
 
-<file path=ppt/slides/slide15.xml><?xml version="1.0" encoding="utf-8"?>
+<file path=ppt/slides/slide16.xml><?xml version="1.0" encoding="utf-8"?>
 <p:sld xmlns:a="http://schemas.openxmlformats.org/drawingml/2006/main" xmlns:r="http://schemas.openxmlformats.org/officeDocument/2006/relationships" xmlns:p="http://schemas.openxmlformats.org/presentationml/2006/main">
   <p:cSld>
     <p:spTree>
@@ -6873,7 +7246,7 @@
           <a:p>
             <a:fld id="{3E200D22-A913-914D-B06C-E294256DAC47}" type="datetime1">
               <a:rPr lang="en-IN" smtClean="0"/>
-              <a:t>03-10-2024</a:t>
+              <a:t>04-10-2024</a:t>
             </a:fld>
             <a:endParaRPr lang="en-US"/>
           </a:p>
@@ -6902,7 +7275,7 @@
           <a:p>
             <a:fld id="{84D618AA-8DAA-FF4E-B18D-27A1BA1C0151}" type="slidenum">
               <a:rPr lang="en-US" smtClean="0"/>
-              <a:t>15</a:t>
+              <a:t>16</a:t>
             </a:fld>
             <a:endParaRPr lang="en-US"/>
           </a:p>
@@ -6970,7 +7343,7 @@
 </p:sld>
 </file>
 
-<file path=ppt/slides/slide16.xml><?xml version="1.0" encoding="utf-8"?>
+<file path=ppt/slides/slide17.xml><?xml version="1.0" encoding="utf-8"?>
 <p:sld xmlns:a="http://schemas.openxmlformats.org/drawingml/2006/main" xmlns:r="http://schemas.openxmlformats.org/officeDocument/2006/relationships" xmlns:p="http://schemas.openxmlformats.org/presentationml/2006/main">
   <p:cSld>
     <p:spTree>
@@ -7038,7 +7411,7 @@
           <a:p>
             <a:fld id="{3E200D22-A913-914D-B06C-E294256DAC47}" type="datetime1">
               <a:rPr lang="en-IN" smtClean="0"/>
-              <a:t>03-10-2024</a:t>
+              <a:t>04-10-2024</a:t>
             </a:fld>
             <a:endParaRPr lang="en-US"/>
           </a:p>
@@ -7067,7 +7440,7 @@
           <a:p>
             <a:fld id="{84D618AA-8DAA-FF4E-B18D-27A1BA1C0151}" type="slidenum">
               <a:rPr lang="en-US" smtClean="0"/>
-              <a:t>16</a:t>
+              <a:t>17</a:t>
             </a:fld>
             <a:endParaRPr lang="en-US"/>
           </a:p>
@@ -7135,7 +7508,7 @@
 </p:sld>
 </file>
 
-<file path=ppt/slides/slide17.xml><?xml version="1.0" encoding="utf-8"?>
+<file path=ppt/slides/slide18.xml><?xml version="1.0" encoding="utf-8"?>
 <p:sld xmlns:a="http://schemas.openxmlformats.org/drawingml/2006/main" xmlns:r="http://schemas.openxmlformats.org/officeDocument/2006/relationships" xmlns:p="http://schemas.openxmlformats.org/presentationml/2006/main">
   <p:cSld>
     <p:spTree>
@@ -7204,7 +7577,7 @@
           <a:p>
             <a:fld id="{3E200D22-A913-914D-B06C-E294256DAC47}" type="datetime1">
               <a:rPr lang="en-IN" smtClean="0"/>
-              <a:t>03-10-2024</a:t>
+              <a:t>04-10-2024</a:t>
             </a:fld>
             <a:endParaRPr lang="en-US"/>
           </a:p>
@@ -7233,7 +7606,7 @@
           <a:p>
             <a:fld id="{84D618AA-8DAA-FF4E-B18D-27A1BA1C0151}" type="slidenum">
               <a:rPr lang="en-US" smtClean="0"/>
-              <a:t>17</a:t>
+              <a:t>18</a:t>
             </a:fld>
             <a:endParaRPr lang="en-US"/>
           </a:p>
@@ -7301,7 +7674,7 @@
 </p:sld>
 </file>
 
-<file path=ppt/slides/slide18.xml><?xml version="1.0" encoding="utf-8"?>
+<file path=ppt/slides/slide19.xml><?xml version="1.0" encoding="utf-8"?>
 <p:sld xmlns:a="http://schemas.openxmlformats.org/drawingml/2006/main" xmlns:r="http://schemas.openxmlformats.org/officeDocument/2006/relationships" xmlns:p="http://schemas.openxmlformats.org/presentationml/2006/main">
   <p:cSld>
     <p:spTree>
@@ -7370,7 +7743,7 @@
           <a:p>
             <a:fld id="{3E200D22-A913-914D-B06C-E294256DAC47}" type="datetime1">
               <a:rPr lang="en-IN" smtClean="0"/>
-              <a:t>03-10-2024</a:t>
+              <a:t>04-10-2024</a:t>
             </a:fld>
             <a:endParaRPr lang="en-US"/>
           </a:p>
@@ -7399,7 +7772,7 @@
           <a:p>
             <a:fld id="{84D618AA-8DAA-FF4E-B18D-27A1BA1C0151}" type="slidenum">
               <a:rPr lang="en-US" smtClean="0"/>
-              <a:t>18</a:t>
+              <a:t>19</a:t>
             </a:fld>
             <a:endParaRPr lang="en-US"/>
           </a:p>
@@ -7467,299 +7840,6 @@
 </p:sld>
 </file>
 
-<file path=ppt/slides/slide19.xml><?xml version="1.0" encoding="utf-8"?>
-<p:sld xmlns:a="http://schemas.openxmlformats.org/drawingml/2006/main" xmlns:r="http://schemas.openxmlformats.org/officeDocument/2006/relationships" xmlns:p="http://schemas.openxmlformats.org/presentationml/2006/main">
-  <p:cSld>
-    <p:spTree>
-      <p:nvGrpSpPr>
-        <p:cNvPr id="1" name=""/>
-        <p:cNvGrpSpPr/>
-        <p:nvPr/>
-      </p:nvGrpSpPr>
-      <p:grpSpPr>
-        <a:xfrm>
-          <a:off x="0" y="0"/>
-          <a:ext cx="0" cy="0"/>
-          <a:chOff x="0" y="0"/>
-          <a:chExt cx="0" cy="0"/>
-        </a:xfrm>
-      </p:grpSpPr>
-      <p:sp>
-        <p:nvSpPr>
-          <p:cNvPr id="2" name="Title 1">
-            <a:extLst>
-              <a:ext uri="{FF2B5EF4-FFF2-40B4-BE49-F238E27FC236}">
-                <a16:creationId xmlns:a16="http://schemas.microsoft.com/office/drawing/2014/main" id="{7AB2FEF9-9912-E578-144E-6ABB90E97A3C}"/>
-              </a:ext>
-            </a:extLst>
-          </p:cNvPr>
-          <p:cNvSpPr>
-            <a:spLocks noGrp="1"/>
-          </p:cNvSpPr>
-          <p:nvPr>
-            <p:ph type="title"/>
-          </p:nvPr>
-        </p:nvSpPr>
-        <p:spPr/>
-        <p:txBody>
-          <a:bodyPr/>
-          <a:lstStyle/>
-          <a:p>
-            <a:r>
-              <a:rPr lang="en-US" dirty="0"/>
-              <a:t>References </a:t>
-            </a:r>
-          </a:p>
-        </p:txBody>
-      </p:sp>
-      <p:sp>
-        <p:nvSpPr>
-          <p:cNvPr id="3" name="Content Placeholder 2">
-            <a:extLst>
-              <a:ext uri="{FF2B5EF4-FFF2-40B4-BE49-F238E27FC236}">
-                <a16:creationId xmlns:a16="http://schemas.microsoft.com/office/drawing/2014/main" id="{774F8A74-EC70-E7BE-48F9-BBC4279BCBF8}"/>
-              </a:ext>
-            </a:extLst>
-          </p:cNvPr>
-          <p:cNvSpPr>
-            <a:spLocks noGrp="1"/>
-          </p:cNvSpPr>
-          <p:nvPr>
-            <p:ph idx="1"/>
-          </p:nvPr>
-        </p:nvSpPr>
-        <p:spPr>
-          <a:xfrm>
-            <a:off x="838200" y="1531710"/>
-            <a:ext cx="10515600" cy="4351338"/>
-          </a:xfrm>
-        </p:spPr>
-        <p:txBody>
-          <a:bodyPr>
-            <a:normAutofit lnSpcReduction="10000"/>
-          </a:bodyPr>
-          <a:lstStyle/>
-          <a:p>
-            <a:pPr algn="just"/>
-            <a:r>
-              <a:rPr lang="en-US" sz="2200" dirty="0">
-                <a:latin typeface="Times New Roman" panose="02020603050405020304" pitchFamily="18" charset="0"/>
-                <a:cs typeface="Times New Roman" panose="02020603050405020304" pitchFamily="18" charset="0"/>
-              </a:rPr>
-              <a:t>Research Papers:</a:t>
-            </a:r>
-          </a:p>
-          <a:p>
-            <a:pPr marL="0" indent="0" algn="just">
-              <a:buNone/>
-            </a:pPr>
-            <a:endParaRPr lang="en-US" sz="2200" dirty="0">
-              <a:latin typeface="Times New Roman" panose="02020603050405020304" pitchFamily="18" charset="0"/>
-              <a:cs typeface="Times New Roman" panose="02020603050405020304" pitchFamily="18" charset="0"/>
-            </a:endParaRPr>
-          </a:p>
-          <a:p>
-            <a:pPr marL="457200" indent="-457200" algn="just">
-              <a:buAutoNum type="arabicPeriod"/>
-            </a:pPr>
-            <a:r>
-              <a:rPr lang="en-US" sz="2200" dirty="0">
-                <a:latin typeface="Times New Roman" panose="02020603050405020304" pitchFamily="18" charset="0"/>
-                <a:cs typeface="Times New Roman" panose="02020603050405020304" pitchFamily="18" charset="0"/>
-              </a:rPr>
-              <a:t>Yadav, K., Yadav, M., &amp; Saini, S. (2021). Stock values predictions using deep learning based hybrid models. CAAI Transactions on Intelligence Technology, 6(3), 266-277. </a:t>
-            </a:r>
-            <a:r>
-              <a:rPr lang="en-US" sz="2200" dirty="0">
-                <a:latin typeface="Times New Roman" panose="02020603050405020304" pitchFamily="18" charset="0"/>
-                <a:cs typeface="Times New Roman" panose="02020603050405020304" pitchFamily="18" charset="0"/>
-                <a:hlinkClick r:id="rId2"/>
-              </a:rPr>
-              <a:t>https://doi.org/10.1049/cit2.12052</a:t>
-            </a:r>
-            <a:endParaRPr lang="en-US" sz="2200" dirty="0">
-              <a:latin typeface="Times New Roman" panose="02020603050405020304" pitchFamily="18" charset="0"/>
-              <a:cs typeface="Times New Roman" panose="02020603050405020304" pitchFamily="18" charset="0"/>
-            </a:endParaRPr>
-          </a:p>
-          <a:p>
-            <a:pPr marL="457200" indent="-457200" algn="just">
-              <a:buFont typeface="+mj-lt"/>
-              <a:buAutoNum type="arabicPeriod"/>
-            </a:pPr>
-            <a:endParaRPr lang="en-US" sz="2200" dirty="0">
-              <a:latin typeface="Times New Roman" panose="02020603050405020304" pitchFamily="18" charset="0"/>
-              <a:cs typeface="Times New Roman" panose="02020603050405020304" pitchFamily="18" charset="0"/>
-            </a:endParaRPr>
-          </a:p>
-          <a:p>
-            <a:pPr marL="457200" indent="-457200" algn="just">
-              <a:buFont typeface="+mj-lt"/>
-              <a:buAutoNum type="arabicPeriod"/>
-            </a:pPr>
-            <a:r>
-              <a:rPr lang="en-US" sz="2200" dirty="0">
-                <a:latin typeface="Times New Roman" panose="02020603050405020304" pitchFamily="18" charset="0"/>
-                <a:cs typeface="Times New Roman" panose="02020603050405020304" pitchFamily="18" charset="0"/>
-              </a:rPr>
-              <a:t>Long, W., Gao, J., Bai, K., &amp; others. (2024). A hybrid model for stock price prediction based on multi-view heterogeneous data. Financial Innovation, 10, 48. </a:t>
-            </a:r>
-            <a:r>
-              <a:rPr lang="en-US" sz="2200" dirty="0">
-                <a:latin typeface="Times New Roman" panose="02020603050405020304" pitchFamily="18" charset="0"/>
-                <a:cs typeface="Times New Roman" panose="02020603050405020304" pitchFamily="18" charset="0"/>
-                <a:hlinkClick r:id="rId3"/>
-              </a:rPr>
-              <a:t>https://doi.org/10.1186/s40854-023-00519-w</a:t>
-            </a:r>
-            <a:endParaRPr lang="en-US" sz="2200" dirty="0">
-              <a:latin typeface="Times New Roman" panose="02020603050405020304" pitchFamily="18" charset="0"/>
-              <a:cs typeface="Times New Roman" panose="02020603050405020304" pitchFamily="18" charset="0"/>
-            </a:endParaRPr>
-          </a:p>
-          <a:p>
-            <a:pPr marL="457200" indent="-457200" algn="just">
-              <a:buFont typeface="+mj-lt"/>
-              <a:buAutoNum type="arabicPeriod"/>
-            </a:pPr>
-            <a:endParaRPr lang="en-US" sz="2200" dirty="0">
-              <a:latin typeface="Times New Roman" panose="02020603050405020304" pitchFamily="18" charset="0"/>
-              <a:cs typeface="Times New Roman" panose="02020603050405020304" pitchFamily="18" charset="0"/>
-            </a:endParaRPr>
-          </a:p>
-          <a:p>
-            <a:pPr marL="457200" indent="-457200" algn="just">
-              <a:buFont typeface="+mj-lt"/>
-              <a:buAutoNum type="arabicPeriod"/>
-            </a:pPr>
-            <a:r>
-              <a:rPr lang="en-US" sz="2200" dirty="0" err="1">
-                <a:latin typeface="Times New Roman" panose="02020603050405020304" pitchFamily="18" charset="0"/>
-                <a:cs typeface="Times New Roman" panose="02020603050405020304" pitchFamily="18" charset="0"/>
-              </a:rPr>
-              <a:t>Srivinay</a:t>
-            </a:r>
-            <a:r>
-              <a:rPr lang="en-US" sz="2200" dirty="0">
-                <a:latin typeface="Times New Roman" panose="02020603050405020304" pitchFamily="18" charset="0"/>
-                <a:cs typeface="Times New Roman" panose="02020603050405020304" pitchFamily="18" charset="0"/>
-              </a:rPr>
-              <a:t>, </a:t>
-            </a:r>
-            <a:r>
-              <a:rPr lang="en-US" sz="2200" dirty="0" err="1">
-                <a:latin typeface="Times New Roman" panose="02020603050405020304" pitchFamily="18" charset="0"/>
-                <a:cs typeface="Times New Roman" panose="02020603050405020304" pitchFamily="18" charset="0"/>
-              </a:rPr>
-              <a:t>Manujakshi</a:t>
-            </a:r>
-            <a:r>
-              <a:rPr lang="en-US" sz="2200" dirty="0">
-                <a:latin typeface="Times New Roman" panose="02020603050405020304" pitchFamily="18" charset="0"/>
-                <a:cs typeface="Times New Roman" panose="02020603050405020304" pitchFamily="18" charset="0"/>
-              </a:rPr>
-              <a:t>, B. C., </a:t>
-            </a:r>
-            <a:r>
-              <a:rPr lang="en-US" sz="2200" dirty="0" err="1">
-                <a:latin typeface="Times New Roman" panose="02020603050405020304" pitchFamily="18" charset="0"/>
-                <a:cs typeface="Times New Roman" panose="02020603050405020304" pitchFamily="18" charset="0"/>
-              </a:rPr>
-              <a:t>Kabadi</a:t>
-            </a:r>
-            <a:r>
-              <a:rPr lang="en-US" sz="2200" dirty="0">
-                <a:latin typeface="Times New Roman" panose="02020603050405020304" pitchFamily="18" charset="0"/>
-                <a:cs typeface="Times New Roman" panose="02020603050405020304" pitchFamily="18" charset="0"/>
-              </a:rPr>
-              <a:t>, M. G., &amp; Naik, N. (2022). A hybrid stock price prediction model based on PRE and deep neural network. Data, 7(5), 51. </a:t>
-            </a:r>
-            <a:r>
-              <a:rPr lang="en-US" sz="2200" dirty="0">
-                <a:latin typeface="Times New Roman" panose="02020603050405020304" pitchFamily="18" charset="0"/>
-                <a:cs typeface="Times New Roman" panose="02020603050405020304" pitchFamily="18" charset="0"/>
-                <a:hlinkClick r:id="rId4"/>
-              </a:rPr>
-              <a:t>https://doi.org/10.3390/data7050051</a:t>
-            </a:r>
-            <a:endParaRPr lang="en-US" sz="2200" dirty="0">
-              <a:latin typeface="Times New Roman" panose="02020603050405020304" pitchFamily="18" charset="0"/>
-              <a:cs typeface="Times New Roman" panose="02020603050405020304" pitchFamily="18" charset="0"/>
-            </a:endParaRPr>
-          </a:p>
-        </p:txBody>
-      </p:sp>
-      <p:sp>
-        <p:nvSpPr>
-          <p:cNvPr id="4" name="Date Placeholder 3">
-            <a:extLst>
-              <a:ext uri="{FF2B5EF4-FFF2-40B4-BE49-F238E27FC236}">
-                <a16:creationId xmlns:a16="http://schemas.microsoft.com/office/drawing/2014/main" id="{9E87B724-C85B-3549-6A16-A3B39A98E304}"/>
-              </a:ext>
-            </a:extLst>
-          </p:cNvPr>
-          <p:cNvSpPr>
-            <a:spLocks noGrp="1"/>
-          </p:cNvSpPr>
-          <p:nvPr>
-            <p:ph type="dt" sz="half" idx="10"/>
-          </p:nvPr>
-        </p:nvSpPr>
-        <p:spPr/>
-        <p:txBody>
-          <a:bodyPr/>
-          <a:lstStyle/>
-          <a:p>
-            <a:fld id="{3E200D22-A913-914D-B06C-E294256DAC47}" type="datetime1">
-              <a:rPr lang="en-IN" smtClean="0"/>
-              <a:t>03-10-2024</a:t>
-            </a:fld>
-            <a:endParaRPr lang="en-US"/>
-          </a:p>
-        </p:txBody>
-      </p:sp>
-      <p:sp>
-        <p:nvSpPr>
-          <p:cNvPr id="5" name="Slide Number Placeholder 4">
-            <a:extLst>
-              <a:ext uri="{FF2B5EF4-FFF2-40B4-BE49-F238E27FC236}">
-                <a16:creationId xmlns:a16="http://schemas.microsoft.com/office/drawing/2014/main" id="{B7AC5ABC-018A-1C83-9D6C-E8720B16A60A}"/>
-              </a:ext>
-            </a:extLst>
-          </p:cNvPr>
-          <p:cNvSpPr>
-            <a:spLocks noGrp="1"/>
-          </p:cNvSpPr>
-          <p:nvPr>
-            <p:ph type="sldNum" sz="quarter" idx="12"/>
-          </p:nvPr>
-        </p:nvSpPr>
-        <p:spPr/>
-        <p:txBody>
-          <a:bodyPr/>
-          <a:lstStyle/>
-          <a:p>
-            <a:fld id="{84D618AA-8DAA-FF4E-B18D-27A1BA1C0151}" type="slidenum">
-              <a:rPr lang="en-US" smtClean="0"/>
-              <a:t>19</a:t>
-            </a:fld>
-            <a:endParaRPr lang="en-US"/>
-          </a:p>
-        </p:txBody>
-      </p:sp>
-    </p:spTree>
-    <p:extLst>
-      <p:ext uri="{BB962C8B-B14F-4D97-AF65-F5344CB8AC3E}">
-        <p14:creationId xmlns:p14="http://schemas.microsoft.com/office/powerpoint/2010/main" val="1134664864"/>
-      </p:ext>
-    </p:extLst>
-  </p:cSld>
-  <p:clrMapOvr>
-    <a:masterClrMapping/>
-  </p:clrMapOvr>
-</p:sld>
-</file>
-
 <file path=ppt/slides/slide2.xml><?xml version="1.0" encoding="utf-8"?>
 <p:sld xmlns:a="http://schemas.openxmlformats.org/drawingml/2006/main" xmlns:r="http://schemas.openxmlformats.org/officeDocument/2006/relationships" xmlns:p="http://schemas.openxmlformats.org/presentationml/2006/main">
   <p:cSld>
@@ -7919,7 +7999,7 @@
           <a:p>
             <a:fld id="{79BCDBF4-CB4E-6B41-840E-413D0B679B2D}" type="datetime1">
               <a:rPr lang="en-IN" smtClean="0"/>
-              <a:t>03-10-2024</a:t>
+              <a:t>04-10-2024</a:t>
             </a:fld>
             <a:endParaRPr lang="en-US"/>
           </a:p>
@@ -7968,6 +8048,299 @@
 </file>
 
 <file path=ppt/slides/slide20.xml><?xml version="1.0" encoding="utf-8"?>
+<p:sld xmlns:a="http://schemas.openxmlformats.org/drawingml/2006/main" xmlns:r="http://schemas.openxmlformats.org/officeDocument/2006/relationships" xmlns:p="http://schemas.openxmlformats.org/presentationml/2006/main">
+  <p:cSld>
+    <p:spTree>
+      <p:nvGrpSpPr>
+        <p:cNvPr id="1" name=""/>
+        <p:cNvGrpSpPr/>
+        <p:nvPr/>
+      </p:nvGrpSpPr>
+      <p:grpSpPr>
+        <a:xfrm>
+          <a:off x="0" y="0"/>
+          <a:ext cx="0" cy="0"/>
+          <a:chOff x="0" y="0"/>
+          <a:chExt cx="0" cy="0"/>
+        </a:xfrm>
+      </p:grpSpPr>
+      <p:sp>
+        <p:nvSpPr>
+          <p:cNvPr id="2" name="Title 1">
+            <a:extLst>
+              <a:ext uri="{FF2B5EF4-FFF2-40B4-BE49-F238E27FC236}">
+                <a16:creationId xmlns:a16="http://schemas.microsoft.com/office/drawing/2014/main" id="{7AB2FEF9-9912-E578-144E-6ABB90E97A3C}"/>
+              </a:ext>
+            </a:extLst>
+          </p:cNvPr>
+          <p:cNvSpPr>
+            <a:spLocks noGrp="1"/>
+          </p:cNvSpPr>
+          <p:nvPr>
+            <p:ph type="title"/>
+          </p:nvPr>
+        </p:nvSpPr>
+        <p:spPr/>
+        <p:txBody>
+          <a:bodyPr/>
+          <a:lstStyle/>
+          <a:p>
+            <a:r>
+              <a:rPr lang="en-US" dirty="0"/>
+              <a:t>References </a:t>
+            </a:r>
+          </a:p>
+        </p:txBody>
+      </p:sp>
+      <p:sp>
+        <p:nvSpPr>
+          <p:cNvPr id="3" name="Content Placeholder 2">
+            <a:extLst>
+              <a:ext uri="{FF2B5EF4-FFF2-40B4-BE49-F238E27FC236}">
+                <a16:creationId xmlns:a16="http://schemas.microsoft.com/office/drawing/2014/main" id="{774F8A74-EC70-E7BE-48F9-BBC4279BCBF8}"/>
+              </a:ext>
+            </a:extLst>
+          </p:cNvPr>
+          <p:cNvSpPr>
+            <a:spLocks noGrp="1"/>
+          </p:cNvSpPr>
+          <p:nvPr>
+            <p:ph idx="1"/>
+          </p:nvPr>
+        </p:nvSpPr>
+        <p:spPr>
+          <a:xfrm>
+            <a:off x="838200" y="1531710"/>
+            <a:ext cx="10515600" cy="4351338"/>
+          </a:xfrm>
+        </p:spPr>
+        <p:txBody>
+          <a:bodyPr>
+            <a:normAutofit lnSpcReduction="10000"/>
+          </a:bodyPr>
+          <a:lstStyle/>
+          <a:p>
+            <a:pPr algn="just"/>
+            <a:r>
+              <a:rPr lang="en-US" sz="2200" dirty="0">
+                <a:latin typeface="Times New Roman" panose="02020603050405020304" pitchFamily="18" charset="0"/>
+                <a:cs typeface="Times New Roman" panose="02020603050405020304" pitchFamily="18" charset="0"/>
+              </a:rPr>
+              <a:t>Research Papers:</a:t>
+            </a:r>
+          </a:p>
+          <a:p>
+            <a:pPr marL="0" indent="0" algn="just">
+              <a:buNone/>
+            </a:pPr>
+            <a:endParaRPr lang="en-US" sz="2200" dirty="0">
+              <a:latin typeface="Times New Roman" panose="02020603050405020304" pitchFamily="18" charset="0"/>
+              <a:cs typeface="Times New Roman" panose="02020603050405020304" pitchFamily="18" charset="0"/>
+            </a:endParaRPr>
+          </a:p>
+          <a:p>
+            <a:pPr marL="457200" indent="-457200" algn="just">
+              <a:buAutoNum type="arabicPeriod"/>
+            </a:pPr>
+            <a:r>
+              <a:rPr lang="en-US" sz="2200" dirty="0">
+                <a:latin typeface="Times New Roman" panose="02020603050405020304" pitchFamily="18" charset="0"/>
+                <a:cs typeface="Times New Roman" panose="02020603050405020304" pitchFamily="18" charset="0"/>
+              </a:rPr>
+              <a:t>Yadav, K., Yadav, M., &amp; Saini, S. (2021). Stock values predictions using deep learning based hybrid models. CAAI Transactions on Intelligence Technology, 6(3), 266-277. </a:t>
+            </a:r>
+            <a:r>
+              <a:rPr lang="en-US" sz="2200" dirty="0">
+                <a:latin typeface="Times New Roman" panose="02020603050405020304" pitchFamily="18" charset="0"/>
+                <a:cs typeface="Times New Roman" panose="02020603050405020304" pitchFamily="18" charset="0"/>
+                <a:hlinkClick r:id="rId2"/>
+              </a:rPr>
+              <a:t>https://doi.org/10.1049/cit2.12052</a:t>
+            </a:r>
+            <a:endParaRPr lang="en-US" sz="2200" dirty="0">
+              <a:latin typeface="Times New Roman" panose="02020603050405020304" pitchFamily="18" charset="0"/>
+              <a:cs typeface="Times New Roman" panose="02020603050405020304" pitchFamily="18" charset="0"/>
+            </a:endParaRPr>
+          </a:p>
+          <a:p>
+            <a:pPr marL="457200" indent="-457200" algn="just">
+              <a:buFont typeface="+mj-lt"/>
+              <a:buAutoNum type="arabicPeriod"/>
+            </a:pPr>
+            <a:endParaRPr lang="en-US" sz="2200" dirty="0">
+              <a:latin typeface="Times New Roman" panose="02020603050405020304" pitchFamily="18" charset="0"/>
+              <a:cs typeface="Times New Roman" panose="02020603050405020304" pitchFamily="18" charset="0"/>
+            </a:endParaRPr>
+          </a:p>
+          <a:p>
+            <a:pPr marL="457200" indent="-457200" algn="just">
+              <a:buFont typeface="+mj-lt"/>
+              <a:buAutoNum type="arabicPeriod"/>
+            </a:pPr>
+            <a:r>
+              <a:rPr lang="en-US" sz="2200" dirty="0">
+                <a:latin typeface="Times New Roman" panose="02020603050405020304" pitchFamily="18" charset="0"/>
+                <a:cs typeface="Times New Roman" panose="02020603050405020304" pitchFamily="18" charset="0"/>
+              </a:rPr>
+              <a:t>Long, W., Gao, J., Bai, K., &amp; others. (2024). A hybrid model for stock price prediction based on multi-view heterogeneous data. Financial Innovation, 10, 48. </a:t>
+            </a:r>
+            <a:r>
+              <a:rPr lang="en-US" sz="2200" dirty="0">
+                <a:latin typeface="Times New Roman" panose="02020603050405020304" pitchFamily="18" charset="0"/>
+                <a:cs typeface="Times New Roman" panose="02020603050405020304" pitchFamily="18" charset="0"/>
+                <a:hlinkClick r:id="rId3"/>
+              </a:rPr>
+              <a:t>https://doi.org/10.1186/s40854-023-00519-w</a:t>
+            </a:r>
+            <a:endParaRPr lang="en-US" sz="2200" dirty="0">
+              <a:latin typeface="Times New Roman" panose="02020603050405020304" pitchFamily="18" charset="0"/>
+              <a:cs typeface="Times New Roman" panose="02020603050405020304" pitchFamily="18" charset="0"/>
+            </a:endParaRPr>
+          </a:p>
+          <a:p>
+            <a:pPr marL="457200" indent="-457200" algn="just">
+              <a:buFont typeface="+mj-lt"/>
+              <a:buAutoNum type="arabicPeriod"/>
+            </a:pPr>
+            <a:endParaRPr lang="en-US" sz="2200" dirty="0">
+              <a:latin typeface="Times New Roman" panose="02020603050405020304" pitchFamily="18" charset="0"/>
+              <a:cs typeface="Times New Roman" panose="02020603050405020304" pitchFamily="18" charset="0"/>
+            </a:endParaRPr>
+          </a:p>
+          <a:p>
+            <a:pPr marL="457200" indent="-457200" algn="just">
+              <a:buFont typeface="+mj-lt"/>
+              <a:buAutoNum type="arabicPeriod"/>
+            </a:pPr>
+            <a:r>
+              <a:rPr lang="en-US" sz="2200" dirty="0" err="1">
+                <a:latin typeface="Times New Roman" panose="02020603050405020304" pitchFamily="18" charset="0"/>
+                <a:cs typeface="Times New Roman" panose="02020603050405020304" pitchFamily="18" charset="0"/>
+              </a:rPr>
+              <a:t>Srivinay</a:t>
+            </a:r>
+            <a:r>
+              <a:rPr lang="en-US" sz="2200" dirty="0">
+                <a:latin typeface="Times New Roman" panose="02020603050405020304" pitchFamily="18" charset="0"/>
+                <a:cs typeface="Times New Roman" panose="02020603050405020304" pitchFamily="18" charset="0"/>
+              </a:rPr>
+              <a:t>, </a:t>
+            </a:r>
+            <a:r>
+              <a:rPr lang="en-US" sz="2200" dirty="0" err="1">
+                <a:latin typeface="Times New Roman" panose="02020603050405020304" pitchFamily="18" charset="0"/>
+                <a:cs typeface="Times New Roman" panose="02020603050405020304" pitchFamily="18" charset="0"/>
+              </a:rPr>
+              <a:t>Manujakshi</a:t>
+            </a:r>
+            <a:r>
+              <a:rPr lang="en-US" sz="2200" dirty="0">
+                <a:latin typeface="Times New Roman" panose="02020603050405020304" pitchFamily="18" charset="0"/>
+                <a:cs typeface="Times New Roman" panose="02020603050405020304" pitchFamily="18" charset="0"/>
+              </a:rPr>
+              <a:t>, B. C., </a:t>
+            </a:r>
+            <a:r>
+              <a:rPr lang="en-US" sz="2200" dirty="0" err="1">
+                <a:latin typeface="Times New Roman" panose="02020603050405020304" pitchFamily="18" charset="0"/>
+                <a:cs typeface="Times New Roman" panose="02020603050405020304" pitchFamily="18" charset="0"/>
+              </a:rPr>
+              <a:t>Kabadi</a:t>
+            </a:r>
+            <a:r>
+              <a:rPr lang="en-US" sz="2200" dirty="0">
+                <a:latin typeface="Times New Roman" panose="02020603050405020304" pitchFamily="18" charset="0"/>
+                <a:cs typeface="Times New Roman" panose="02020603050405020304" pitchFamily="18" charset="0"/>
+              </a:rPr>
+              <a:t>, M. G., &amp; Naik, N. (2022). A hybrid stock price prediction model based on PRE and deep neural network. Data, 7(5), 51. </a:t>
+            </a:r>
+            <a:r>
+              <a:rPr lang="en-US" sz="2200" dirty="0">
+                <a:latin typeface="Times New Roman" panose="02020603050405020304" pitchFamily="18" charset="0"/>
+                <a:cs typeface="Times New Roman" panose="02020603050405020304" pitchFamily="18" charset="0"/>
+                <a:hlinkClick r:id="rId4"/>
+              </a:rPr>
+              <a:t>https://doi.org/10.3390/data7050051</a:t>
+            </a:r>
+            <a:endParaRPr lang="en-US" sz="2200" dirty="0">
+              <a:latin typeface="Times New Roman" panose="02020603050405020304" pitchFamily="18" charset="0"/>
+              <a:cs typeface="Times New Roman" panose="02020603050405020304" pitchFamily="18" charset="0"/>
+            </a:endParaRPr>
+          </a:p>
+        </p:txBody>
+      </p:sp>
+      <p:sp>
+        <p:nvSpPr>
+          <p:cNvPr id="4" name="Date Placeholder 3">
+            <a:extLst>
+              <a:ext uri="{FF2B5EF4-FFF2-40B4-BE49-F238E27FC236}">
+                <a16:creationId xmlns:a16="http://schemas.microsoft.com/office/drawing/2014/main" id="{9E87B724-C85B-3549-6A16-A3B39A98E304}"/>
+              </a:ext>
+            </a:extLst>
+          </p:cNvPr>
+          <p:cNvSpPr>
+            <a:spLocks noGrp="1"/>
+          </p:cNvSpPr>
+          <p:nvPr>
+            <p:ph type="dt" sz="half" idx="10"/>
+          </p:nvPr>
+        </p:nvSpPr>
+        <p:spPr/>
+        <p:txBody>
+          <a:bodyPr/>
+          <a:lstStyle/>
+          <a:p>
+            <a:fld id="{3E200D22-A913-914D-B06C-E294256DAC47}" type="datetime1">
+              <a:rPr lang="en-IN" smtClean="0"/>
+              <a:t>04-10-2024</a:t>
+            </a:fld>
+            <a:endParaRPr lang="en-US"/>
+          </a:p>
+        </p:txBody>
+      </p:sp>
+      <p:sp>
+        <p:nvSpPr>
+          <p:cNvPr id="5" name="Slide Number Placeholder 4">
+            <a:extLst>
+              <a:ext uri="{FF2B5EF4-FFF2-40B4-BE49-F238E27FC236}">
+                <a16:creationId xmlns:a16="http://schemas.microsoft.com/office/drawing/2014/main" id="{B7AC5ABC-018A-1C83-9D6C-E8720B16A60A}"/>
+              </a:ext>
+            </a:extLst>
+          </p:cNvPr>
+          <p:cNvSpPr>
+            <a:spLocks noGrp="1"/>
+          </p:cNvSpPr>
+          <p:nvPr>
+            <p:ph type="sldNum" sz="quarter" idx="12"/>
+          </p:nvPr>
+        </p:nvSpPr>
+        <p:spPr/>
+        <p:txBody>
+          <a:bodyPr/>
+          <a:lstStyle/>
+          <a:p>
+            <a:fld id="{84D618AA-8DAA-FF4E-B18D-27A1BA1C0151}" type="slidenum">
+              <a:rPr lang="en-US" smtClean="0"/>
+              <a:t>20</a:t>
+            </a:fld>
+            <a:endParaRPr lang="en-US"/>
+          </a:p>
+        </p:txBody>
+      </p:sp>
+    </p:spTree>
+    <p:extLst>
+      <p:ext uri="{BB962C8B-B14F-4D97-AF65-F5344CB8AC3E}">
+        <p14:creationId xmlns:p14="http://schemas.microsoft.com/office/powerpoint/2010/main" val="1134664864"/>
+      </p:ext>
+    </p:extLst>
+  </p:cSld>
+  <p:clrMapOvr>
+    <a:masterClrMapping/>
+  </p:clrMapOvr>
+</p:sld>
+</file>
+
+<file path=ppt/slides/slide21.xml><?xml version="1.0" encoding="utf-8"?>
 <p:sld xmlns:a="http://schemas.openxmlformats.org/drawingml/2006/main" xmlns:r="http://schemas.openxmlformats.org/officeDocument/2006/relationships" xmlns:p="http://schemas.openxmlformats.org/presentationml/2006/main">
   <p:cSld>
     <p:bg>
@@ -12755,7 +13128,7 @@
                   <a:spcPts val="600"/>
                 </a:spcAft>
               </a:pPr>
-              <a:t>10/3/2024</a:t>
+              <a:t>10/4/2024</a:t>
             </a:fld>
             <a:endParaRPr lang="en-US">
               <a:solidFill>
@@ -12813,7 +13186,7 @@
                   <a:spcPts val="600"/>
                 </a:spcAft>
               </a:pPr>
-              <a:t>20</a:t>
+              <a:t>21</a:t>
             </a:fld>
             <a:endParaRPr lang="en-US">
               <a:solidFill>
@@ -13012,7 +13385,7 @@
           <a:p>
             <a:fld id="{3E200D22-A913-914D-B06C-E294256DAC47}" type="datetime1">
               <a:rPr lang="en-IN" smtClean="0"/>
-              <a:t>03-10-2024</a:t>
+              <a:t>04-10-2024</a:t>
             </a:fld>
             <a:endParaRPr lang="en-US"/>
           </a:p>
@@ -13200,7 +13573,7 @@
           <a:p>
             <a:fld id="{3E200D22-A913-914D-B06C-E294256DAC47}" type="datetime1">
               <a:rPr lang="en-IN" smtClean="0"/>
-              <a:t>03-10-2024</a:t>
+              <a:t>04-10-2024</a:t>
             </a:fld>
             <a:endParaRPr lang="en-US"/>
           </a:p>
@@ -13369,7 +13742,7 @@
           <a:p>
             <a:fld id="{3E200D22-A913-914D-B06C-E294256DAC47}" type="datetime1">
               <a:rPr lang="en-IN" smtClean="0"/>
-              <a:t>03-10-2024</a:t>
+              <a:t>04-10-2024</a:t>
             </a:fld>
             <a:endParaRPr lang="en-US"/>
           </a:p>
@@ -13649,7 +14022,7 @@
           <a:p>
             <a:fld id="{3E200D22-A913-914D-B06C-E294256DAC47}" type="datetime1">
               <a:rPr lang="en-IN" smtClean="0"/>
-              <a:t>03-10-2024</a:t>
+              <a:t>04-10-2024</a:t>
             </a:fld>
             <a:endParaRPr lang="en-US"/>
           </a:p>
@@ -13889,7 +14262,7 @@
           <a:p>
             <a:fld id="{3E200D22-A913-914D-B06C-E294256DAC47}" type="datetime1">
               <a:rPr lang="en-IN" smtClean="0"/>
-              <a:t>03-10-2024</a:t>
+              <a:t>04-10-2024</a:t>
             </a:fld>
             <a:endParaRPr lang="en-US"/>
           </a:p>
@@ -13959,7 +14332,7 @@
           <p:cNvPr id="2" name="Title 1">
             <a:extLst>
               <a:ext uri="{FF2B5EF4-FFF2-40B4-BE49-F238E27FC236}">
-                <a16:creationId xmlns:a16="http://schemas.microsoft.com/office/drawing/2014/main" id="{0F16EA6B-C339-453A-1015-B15085D37069}"/>
+                <a16:creationId xmlns:a16="http://schemas.microsoft.com/office/drawing/2014/main" id="{A2F572EF-5564-223F-B25C-8E63E427D88E}"/>
               </a:ext>
             </a:extLst>
           </p:cNvPr>
@@ -13976,190 +14349,48 @@
           <a:lstStyle/>
           <a:p>
             <a:r>
-              <a:rPr lang="en-US" dirty="0"/>
-              <a:t>Expected Outcome</a:t>
-            </a:r>
+              <a:rPr lang="en-IN"/>
+              <a:t>System Flowchart</a:t>
+            </a:r>
+            <a:endParaRPr lang="en-IN" dirty="0"/>
           </a:p>
         </p:txBody>
       </p:sp>
-      <p:sp>
-        <p:nvSpPr>
-          <p:cNvPr id="3" name="Content Placeholder 2">
-            <a:extLst>
-              <a:ext uri="{FF2B5EF4-FFF2-40B4-BE49-F238E27FC236}">
-                <a16:creationId xmlns:a16="http://schemas.microsoft.com/office/drawing/2014/main" id="{DED83B84-515A-BC8B-C6DA-A355C4672C56}"/>
-              </a:ext>
-            </a:extLst>
-          </p:cNvPr>
-          <p:cNvSpPr>
-            <a:spLocks noGrp="1"/>
-          </p:cNvSpPr>
+      <p:pic>
+        <p:nvPicPr>
+          <p:cNvPr id="7" name="Content Placeholder 6">
+            <a:extLst>
+              <a:ext uri="{FF2B5EF4-FFF2-40B4-BE49-F238E27FC236}">
+                <a16:creationId xmlns:a16="http://schemas.microsoft.com/office/drawing/2014/main" id="{B22EF494-A78B-5737-A528-65D207D27953}"/>
+              </a:ext>
+            </a:extLst>
+          </p:cNvPr>
+          <p:cNvPicPr>
+            <a:picLocks noGrp="1" noChangeAspect="1"/>
+          </p:cNvPicPr>
           <p:nvPr>
             <p:ph idx="1"/>
           </p:nvPr>
-        </p:nvSpPr>
-        <p:spPr/>
-        <p:txBody>
-          <a:bodyPr>
-            <a:normAutofit fontScale="85000" lnSpcReduction="20000"/>
-          </a:bodyPr>
-          <a:lstStyle/>
-          <a:p>
-            <a:pPr marL="0" indent="0" algn="just">
-              <a:buNone/>
-            </a:pPr>
-            <a:r>
-              <a:rPr lang="en-US" dirty="0">
-                <a:latin typeface="Times New Roman" panose="02020603050405020304" pitchFamily="18" charset="0"/>
-                <a:cs typeface="Times New Roman" panose="02020603050405020304" pitchFamily="18" charset="0"/>
-              </a:rPr>
-              <a:t>We aim to develop a comprehensive deployed website using </a:t>
-            </a:r>
-            <a:r>
-              <a:rPr lang="en-US" b="1" dirty="0" err="1">
-                <a:latin typeface="Times New Roman" panose="02020603050405020304" pitchFamily="18" charset="0"/>
-                <a:cs typeface="Times New Roman" panose="02020603050405020304" pitchFamily="18" charset="0"/>
-              </a:rPr>
-              <a:t>Streamlit</a:t>
-            </a:r>
-            <a:r>
-              <a:rPr lang="en-US" dirty="0">
-                <a:latin typeface="Times New Roman" panose="02020603050405020304" pitchFamily="18" charset="0"/>
-                <a:cs typeface="Times New Roman" panose="02020603050405020304" pitchFamily="18" charset="0"/>
-              </a:rPr>
-              <a:t>, along with a </a:t>
-            </a:r>
-            <a:r>
-              <a:rPr lang="en-US" b="1" dirty="0">
-                <a:latin typeface="Times New Roman" panose="02020603050405020304" pitchFamily="18" charset="0"/>
-                <a:cs typeface="Times New Roman" panose="02020603050405020304" pitchFamily="18" charset="0"/>
-              </a:rPr>
-              <a:t>Grafana</a:t>
-            </a:r>
-            <a:r>
-              <a:rPr lang="en-US" dirty="0">
-                <a:latin typeface="Times New Roman" panose="02020603050405020304" pitchFamily="18" charset="0"/>
-                <a:cs typeface="Times New Roman" panose="02020603050405020304" pitchFamily="18" charset="0"/>
-              </a:rPr>
-              <a:t> dashboard hosted on localhost. The primary features will include:</a:t>
-            </a:r>
-          </a:p>
-          <a:p>
-            <a:pPr algn="just">
-              <a:buFont typeface="+mj-lt"/>
-              <a:buAutoNum type="arabicPeriod"/>
-            </a:pPr>
-            <a:r>
-              <a:rPr lang="en-US" b="1" dirty="0">
-                <a:latin typeface="Times New Roman" panose="02020603050405020304" pitchFamily="18" charset="0"/>
-                <a:cs typeface="Times New Roman" panose="02020603050405020304" pitchFamily="18" charset="0"/>
-              </a:rPr>
-              <a:t>Stock Price Prediction</a:t>
-            </a:r>
-            <a:r>
-              <a:rPr lang="en-US" dirty="0">
-                <a:latin typeface="Times New Roman" panose="02020603050405020304" pitchFamily="18" charset="0"/>
-                <a:cs typeface="Times New Roman" panose="02020603050405020304" pitchFamily="18" charset="0"/>
-              </a:rPr>
-              <a:t>: The </a:t>
-            </a:r>
-            <a:r>
-              <a:rPr lang="en-US" dirty="0" err="1">
-                <a:latin typeface="Times New Roman" panose="02020603050405020304" pitchFamily="18" charset="0"/>
-                <a:cs typeface="Times New Roman" panose="02020603050405020304" pitchFamily="18" charset="0"/>
-              </a:rPr>
-              <a:t>Streamlit</a:t>
-            </a:r>
-            <a:r>
-              <a:rPr lang="en-US" dirty="0">
-                <a:latin typeface="Times New Roman" panose="02020603050405020304" pitchFamily="18" charset="0"/>
-                <a:cs typeface="Times New Roman" panose="02020603050405020304" pitchFamily="18" charset="0"/>
-              </a:rPr>
-              <a:t> website will allow users to input various stock parameters, such as high, low, and open prices, and will predict the closing price based on these inputs.</a:t>
-            </a:r>
-          </a:p>
-          <a:p>
-            <a:pPr algn="just">
-              <a:buFont typeface="+mj-lt"/>
-              <a:buAutoNum type="arabicPeriod"/>
-            </a:pPr>
-            <a:r>
-              <a:rPr lang="en-US" b="1" dirty="0">
-                <a:latin typeface="Times New Roman" panose="02020603050405020304" pitchFamily="18" charset="0"/>
-                <a:cs typeface="Times New Roman" panose="02020603050405020304" pitchFamily="18" charset="0"/>
-              </a:rPr>
-              <a:t>Sentiment Analysis from News</a:t>
-            </a:r>
-            <a:r>
-              <a:rPr lang="en-US" dirty="0">
-                <a:latin typeface="Times New Roman" panose="02020603050405020304" pitchFamily="18" charset="0"/>
-                <a:cs typeface="Times New Roman" panose="02020603050405020304" pitchFamily="18" charset="0"/>
-              </a:rPr>
-              <a:t>: We will gather news headlines and articles as input, performing sentiment analysis to predict market trends. Based on the sentiment, the system will determine whether the market is bullish (uptrend) or bearish (downtrend).</a:t>
-            </a:r>
-          </a:p>
-          <a:p>
-            <a:pPr algn="just">
-              <a:buFont typeface="+mj-lt"/>
-              <a:buAutoNum type="arabicPeriod"/>
-            </a:pPr>
-            <a:r>
-              <a:rPr lang="en-US" b="1" dirty="0">
-                <a:latin typeface="Times New Roman" panose="02020603050405020304" pitchFamily="18" charset="0"/>
-                <a:cs typeface="Times New Roman" panose="02020603050405020304" pitchFamily="18" charset="0"/>
-              </a:rPr>
-              <a:t>Data Storage and Accessibility</a:t>
-            </a:r>
-            <a:r>
-              <a:rPr lang="en-US" dirty="0">
-                <a:latin typeface="Times New Roman" panose="02020603050405020304" pitchFamily="18" charset="0"/>
-                <a:cs typeface="Times New Roman" panose="02020603050405020304" pitchFamily="18" charset="0"/>
-              </a:rPr>
-              <a:t>: We will utilize </a:t>
-            </a:r>
-            <a:r>
-              <a:rPr lang="en-US" b="1" dirty="0" err="1">
-                <a:latin typeface="Times New Roman" panose="02020603050405020304" pitchFamily="18" charset="0"/>
-                <a:cs typeface="Times New Roman" panose="02020603050405020304" pitchFamily="18" charset="0"/>
-              </a:rPr>
-              <a:t>InfluxDB</a:t>
-            </a:r>
-            <a:r>
-              <a:rPr lang="en-US" dirty="0">
-                <a:latin typeface="Times New Roman" panose="02020603050405020304" pitchFamily="18" charset="0"/>
-                <a:cs typeface="Times New Roman" panose="02020603050405020304" pitchFamily="18" charset="0"/>
-              </a:rPr>
-              <a:t> for efficient data storage, ensuring that our dataset can be accessed at any time.</a:t>
-            </a:r>
-          </a:p>
-          <a:p>
-            <a:pPr algn="just">
-              <a:buFont typeface="+mj-lt"/>
-              <a:buAutoNum type="arabicPeriod"/>
-            </a:pPr>
-            <a:r>
-              <a:rPr lang="en-US" b="1" dirty="0">
-                <a:latin typeface="Times New Roman" panose="02020603050405020304" pitchFamily="18" charset="0"/>
-                <a:cs typeface="Times New Roman" panose="02020603050405020304" pitchFamily="18" charset="0"/>
-              </a:rPr>
-              <a:t>Historical Data Visualization</a:t>
-            </a:r>
-            <a:r>
-              <a:rPr lang="en-US" dirty="0">
-                <a:latin typeface="Times New Roman" panose="02020603050405020304" pitchFamily="18" charset="0"/>
-                <a:cs typeface="Times New Roman" panose="02020603050405020304" pitchFamily="18" charset="0"/>
-              </a:rPr>
-              <a:t>: The Grafana dashboard, running on localhost, will visualize historical data, enhancing user understanding of trends and providing insights into stock performance over time.</a:t>
-            </a:r>
-          </a:p>
-        </p:txBody>
-      </p:sp>
+        </p:nvPicPr>
+        <p:blipFill>
+          <a:blip r:embed="rId2"/>
+          <a:stretch>
+            <a:fillRect/>
+          </a:stretch>
+        </p:blipFill>
+        <p:spPr>
+          <a:xfrm>
+            <a:off x="223384" y="2749897"/>
+            <a:ext cx="11772673" cy="2777615"/>
+          </a:xfrm>
+        </p:spPr>
+      </p:pic>
       <p:sp>
         <p:nvSpPr>
           <p:cNvPr id="4" name="Date Placeholder 3">
             <a:extLst>
               <a:ext uri="{FF2B5EF4-FFF2-40B4-BE49-F238E27FC236}">
-                <a16:creationId xmlns:a16="http://schemas.microsoft.com/office/drawing/2014/main" id="{43F83EBD-4728-4836-3779-35AD88067941}"/>
+                <a16:creationId xmlns:a16="http://schemas.microsoft.com/office/drawing/2014/main" id="{105F1097-999F-4626-E668-D9B9FA3780FA}"/>
               </a:ext>
             </a:extLst>
           </p:cNvPr>
@@ -14177,7 +14408,7 @@
           <a:p>
             <a:fld id="{3E200D22-A913-914D-B06C-E294256DAC47}" type="datetime1">
               <a:rPr lang="en-IN" smtClean="0"/>
-              <a:t>03-10-2024</a:t>
+              <a:t>04-10-2024</a:t>
             </a:fld>
             <a:endParaRPr lang="en-US"/>
           </a:p>
@@ -14188,7 +14419,7 @@
           <p:cNvPr id="5" name="Slide Number Placeholder 4">
             <a:extLst>
               <a:ext uri="{FF2B5EF4-FFF2-40B4-BE49-F238E27FC236}">
-                <a16:creationId xmlns:a16="http://schemas.microsoft.com/office/drawing/2014/main" id="{EF9AD802-A1FA-5329-0CBC-B848F981BD7C}"/>
+                <a16:creationId xmlns:a16="http://schemas.microsoft.com/office/drawing/2014/main" id="{2F223A94-A9B2-0BF6-9963-AD348C5E2EE6}"/>
               </a:ext>
             </a:extLst>
           </p:cNvPr>
@@ -14215,7 +14446,7 @@
     </p:spTree>
     <p:extLst>
       <p:ext uri="{BB962C8B-B14F-4D97-AF65-F5344CB8AC3E}">
-        <p14:creationId xmlns:p14="http://schemas.microsoft.com/office/powerpoint/2010/main" val="2165926810"/>
+        <p14:creationId xmlns:p14="http://schemas.microsoft.com/office/powerpoint/2010/main" val="3490741308"/>
       </p:ext>
     </p:extLst>
   </p:cSld>
@@ -14247,7 +14478,7 @@
           <p:cNvPr id="2" name="Title 1">
             <a:extLst>
               <a:ext uri="{FF2B5EF4-FFF2-40B4-BE49-F238E27FC236}">
-                <a16:creationId xmlns:a16="http://schemas.microsoft.com/office/drawing/2014/main" id="{08EA45C0-3F3A-61CC-368A-7B4BB80C5B8D}"/>
+                <a16:creationId xmlns:a16="http://schemas.microsoft.com/office/drawing/2014/main" id="{0F16EA6B-C339-453A-1015-B15085D37069}"/>
               </a:ext>
             </a:extLst>
           </p:cNvPr>
@@ -14265,7 +14496,7 @@
           <a:p>
             <a:r>
               <a:rPr lang="en-US" dirty="0"/>
-              <a:t>Discussions</a:t>
+              <a:t>Expected Outcome</a:t>
             </a:r>
           </a:p>
         </p:txBody>
@@ -14275,7 +14506,7 @@
           <p:cNvPr id="3" name="Content Placeholder 2">
             <a:extLst>
               <a:ext uri="{FF2B5EF4-FFF2-40B4-BE49-F238E27FC236}">
-                <a16:creationId xmlns:a16="http://schemas.microsoft.com/office/drawing/2014/main" id="{6B468376-38B7-27CF-F713-A8C458AC65ED}"/>
+                <a16:creationId xmlns:a16="http://schemas.microsoft.com/office/drawing/2014/main" id="{DED83B84-515A-BC8B-C6DA-A355C4672C56}"/>
               </a:ext>
             </a:extLst>
           </p:cNvPr>
@@ -14289,7 +14520,7 @@
         <p:spPr/>
         <p:txBody>
           <a:bodyPr>
-            <a:normAutofit fontScale="92500" lnSpcReduction="20000"/>
+            <a:normAutofit fontScale="85000" lnSpcReduction="20000"/>
           </a:bodyPr>
           <a:lstStyle/>
           <a:p>
@@ -14301,21 +14532,35 @@
                 <a:latin typeface="Times New Roman" panose="02020603050405020304" pitchFamily="18" charset="0"/>
                 <a:cs typeface="Times New Roman" panose="02020603050405020304" pitchFamily="18" charset="0"/>
               </a:rPr>
-              <a:t>Our project, </a:t>
+              <a:t>We aim to develop a comprehensive deployed website using </a:t>
+            </a:r>
+            <a:r>
+              <a:rPr lang="en-US" b="1" dirty="0" err="1">
+                <a:latin typeface="Times New Roman" panose="02020603050405020304" pitchFamily="18" charset="0"/>
+                <a:cs typeface="Times New Roman" panose="02020603050405020304" pitchFamily="18" charset="0"/>
+              </a:rPr>
+              <a:t>Streamlit</a:t>
+            </a:r>
+            <a:r>
+              <a:rPr lang="en-US" dirty="0">
+                <a:latin typeface="Times New Roman" panose="02020603050405020304" pitchFamily="18" charset="0"/>
+                <a:cs typeface="Times New Roman" panose="02020603050405020304" pitchFamily="18" charset="0"/>
+              </a:rPr>
+              <a:t>, along with a </a:t>
             </a:r>
             <a:r>
               <a:rPr lang="en-US" b="1" dirty="0">
                 <a:latin typeface="Times New Roman" panose="02020603050405020304" pitchFamily="18" charset="0"/>
                 <a:cs typeface="Times New Roman" panose="02020603050405020304" pitchFamily="18" charset="0"/>
               </a:rPr>
-              <a:t>Advanced Stock Price Forecasting Using a Hybrid Model of Numerical and Textual Analysis</a:t>
+              <a:t>Grafana</a:t>
             </a:r>
             <a:r>
               <a:rPr lang="en-US" dirty="0">
                 <a:latin typeface="Times New Roman" panose="02020603050405020304" pitchFamily="18" charset="0"/>
                 <a:cs typeface="Times New Roman" panose="02020603050405020304" pitchFamily="18" charset="0"/>
               </a:rPr>
-              <a:t>, focuses on predicting stock prices using both numerical data and financial news.</a:t>
+              <a:t> dashboard hosted on localhost. The primary features will include:</a:t>
             </a:r>
           </a:p>
           <a:p>
@@ -14328,70 +14573,28 @@
                 <a:latin typeface="Times New Roman" panose="02020603050405020304" pitchFamily="18" charset="0"/>
                 <a:cs typeface="Times New Roman" panose="02020603050405020304" pitchFamily="18" charset="0"/>
               </a:rPr>
-              <a:t>Dataset Preparation</a:t>
+              <a:t>Stock Price Prediction</a:t>
             </a:r>
             <a:r>
               <a:rPr lang="en-US" dirty="0">
                 <a:latin typeface="Times New Roman" panose="02020603050405020304" pitchFamily="18" charset="0"/>
                 <a:cs typeface="Times New Roman" panose="02020603050405020304" pitchFamily="18" charset="0"/>
               </a:rPr>
-              <a:t>: We've completed </a:t>
-            </a:r>
-            <a:r>
-              <a:rPr lang="en-US" b="1" dirty="0">
+              <a:t>: The </a:t>
+            </a:r>
+            <a:r>
+              <a:rPr lang="en-US" dirty="0" err="1">
                 <a:latin typeface="Times New Roman" panose="02020603050405020304" pitchFamily="18" charset="0"/>
                 <a:cs typeface="Times New Roman" panose="02020603050405020304" pitchFamily="18" charset="0"/>
               </a:rPr>
-              <a:t>data preprocessing</a:t>
+              <a:t>Streamlit</a:t>
             </a:r>
             <a:r>
               <a:rPr lang="en-US" dirty="0">
                 <a:latin typeface="Times New Roman" panose="02020603050405020304" pitchFamily="18" charset="0"/>
                 <a:cs typeface="Times New Roman" panose="02020603050405020304" pitchFamily="18" charset="0"/>
               </a:rPr>
-              <a:t> and </a:t>
-            </a:r>
-            <a:r>
-              <a:rPr lang="en-US" b="1" dirty="0">
-                <a:latin typeface="Times New Roman" panose="02020603050405020304" pitchFamily="18" charset="0"/>
-                <a:cs typeface="Times New Roman" panose="02020603050405020304" pitchFamily="18" charset="0"/>
-              </a:rPr>
-              <a:t>EDA</a:t>
-            </a:r>
-            <a:r>
-              <a:rPr lang="en-US" dirty="0">
-                <a:latin typeface="Times New Roman" panose="02020603050405020304" pitchFamily="18" charset="0"/>
-                <a:cs typeface="Times New Roman" panose="02020603050405020304" pitchFamily="18" charset="0"/>
-              </a:rPr>
-              <a:t> for stock data from </a:t>
-            </a:r>
-            <a:r>
-              <a:rPr lang="en-US" b="1" dirty="0">
-                <a:latin typeface="Times New Roman" panose="02020603050405020304" pitchFamily="18" charset="0"/>
-                <a:cs typeface="Times New Roman" panose="02020603050405020304" pitchFamily="18" charset="0"/>
-              </a:rPr>
-              <a:t>TCS</a:t>
-            </a:r>
-            <a:r>
-              <a:rPr lang="en-US" dirty="0">
-                <a:latin typeface="Times New Roman" panose="02020603050405020304" pitchFamily="18" charset="0"/>
-                <a:cs typeface="Times New Roman" panose="02020603050405020304" pitchFamily="18" charset="0"/>
-              </a:rPr>
-              <a:t> and </a:t>
-            </a:r>
-            <a:r>
-              <a:rPr lang="en-US" b="1" dirty="0">
-                <a:latin typeface="Times New Roman" panose="02020603050405020304" pitchFamily="18" charset="0"/>
-                <a:cs typeface="Times New Roman" panose="02020603050405020304" pitchFamily="18" charset="0"/>
-              </a:rPr>
-              <a:t>Google</a:t>
-            </a:r>
-            <a:r>
-              <a:rPr lang="en-US" dirty="0">
-                <a:latin typeface="Times New Roman" panose="02020603050405020304" pitchFamily="18" charset="0"/>
-                <a:cs typeface="Times New Roman" panose="02020603050405020304" pitchFamily="18" charset="0"/>
-              </a:rPr>
-              <a:t>, which will be integrated into the model.</a:t>
+              <a:t> website will allow users to input various stock parameters, such as high, low, and open prices, and will predict the closing price based on these inputs.</a:t>
             </a:r>
           </a:p>
           <a:p>
@@ -14404,28 +14607,14 @@
                 <a:latin typeface="Times New Roman" panose="02020603050405020304" pitchFamily="18" charset="0"/>
                 <a:cs typeface="Times New Roman" panose="02020603050405020304" pitchFamily="18" charset="0"/>
               </a:rPr>
-              <a:t>Text Data Preprocessing</a:t>
+              <a:t>Sentiment Analysis from News</a:t>
             </a:r>
             <a:r>
               <a:rPr lang="en-US" dirty="0">
                 <a:latin typeface="Times New Roman" panose="02020603050405020304" pitchFamily="18" charset="0"/>
                 <a:cs typeface="Times New Roman" panose="02020603050405020304" pitchFamily="18" charset="0"/>
               </a:rPr>
-              <a:t>: Initial </a:t>
-            </a:r>
-            <a:r>
-              <a:rPr lang="en-US" b="1" dirty="0">
-                <a:latin typeface="Times New Roman" panose="02020603050405020304" pitchFamily="18" charset="0"/>
-                <a:cs typeface="Times New Roman" panose="02020603050405020304" pitchFamily="18" charset="0"/>
-              </a:rPr>
-              <a:t>cleaning and preprocessing</a:t>
-            </a:r>
-            <a:r>
-              <a:rPr lang="en-US" dirty="0">
-                <a:latin typeface="Times New Roman" panose="02020603050405020304" pitchFamily="18" charset="0"/>
-                <a:cs typeface="Times New Roman" panose="02020603050405020304" pitchFamily="18" charset="0"/>
-              </a:rPr>
-              <a:t> of financial news data is underway for sentiment analysis.</a:t>
+              <a:t>: We will gather news headlines and articles as input, performing sentiment analysis to predict market trends. Based on the sentiment, the system will determine whether the market is bullish (uptrend) or bearish (downtrend).</a:t>
             </a:r>
           </a:p>
           <a:p>
@@ -14438,14 +14627,28 @@
                 <a:latin typeface="Times New Roman" panose="02020603050405020304" pitchFamily="18" charset="0"/>
                 <a:cs typeface="Times New Roman" panose="02020603050405020304" pitchFamily="18" charset="0"/>
               </a:rPr>
-              <a:t>Research and Learning</a:t>
+              <a:t>Data Storage and Accessibility</a:t>
             </a:r>
             <a:r>
               <a:rPr lang="en-US" dirty="0">
                 <a:latin typeface="Times New Roman" panose="02020603050405020304" pitchFamily="18" charset="0"/>
                 <a:cs typeface="Times New Roman" panose="02020603050405020304" pitchFamily="18" charset="0"/>
               </a:rPr>
-              <a:t>: We are reviewing research papers and algorithms. We plan to build separate models for numerical and textual data before integrating them into a hybrid model.</a:t>
+              <a:t>: We will utilize </a:t>
+            </a:r>
+            <a:r>
+              <a:rPr lang="en-US" b="1" dirty="0" err="1">
+                <a:latin typeface="Times New Roman" panose="02020603050405020304" pitchFamily="18" charset="0"/>
+                <a:cs typeface="Times New Roman" panose="02020603050405020304" pitchFamily="18" charset="0"/>
+              </a:rPr>
+              <a:t>InfluxDB</a:t>
+            </a:r>
+            <a:r>
+              <a:rPr lang="en-US" dirty="0">
+                <a:latin typeface="Times New Roman" panose="02020603050405020304" pitchFamily="18" charset="0"/>
+                <a:cs typeface="Times New Roman" panose="02020603050405020304" pitchFamily="18" charset="0"/>
+              </a:rPr>
+              <a:t> for efficient data storage, ensuring that our dataset can be accessed at any time.</a:t>
             </a:r>
           </a:p>
           <a:p>
@@ -14458,70 +14661,14 @@
                 <a:latin typeface="Times New Roman" panose="02020603050405020304" pitchFamily="18" charset="0"/>
                 <a:cs typeface="Times New Roman" panose="02020603050405020304" pitchFamily="18" charset="0"/>
               </a:rPr>
-              <a:t>Next Steps</a:t>
+              <a:t>Historical Data Visualization</a:t>
             </a:r>
             <a:r>
               <a:rPr lang="en-US" dirty="0">
                 <a:latin typeface="Times New Roman" panose="02020603050405020304" pitchFamily="18" charset="0"/>
                 <a:cs typeface="Times New Roman" panose="02020603050405020304" pitchFamily="18" charset="0"/>
               </a:rPr>
-              <a:t>: The next phase includes </a:t>
-            </a:r>
-            <a:r>
-              <a:rPr lang="en-US" b="1" dirty="0">
-                <a:latin typeface="Times New Roman" panose="02020603050405020304" pitchFamily="18" charset="0"/>
-                <a:cs typeface="Times New Roman" panose="02020603050405020304" pitchFamily="18" charset="0"/>
-              </a:rPr>
-              <a:t>model building</a:t>
-            </a:r>
-            <a:r>
-              <a:rPr lang="en-US" dirty="0">
-                <a:latin typeface="Times New Roman" panose="02020603050405020304" pitchFamily="18" charset="0"/>
-                <a:cs typeface="Times New Roman" panose="02020603050405020304" pitchFamily="18" charset="0"/>
-              </a:rPr>
-              <a:t> and integration, followed by </a:t>
-            </a:r>
-            <a:r>
-              <a:rPr lang="en-US" b="1" dirty="0">
-                <a:latin typeface="Times New Roman" panose="02020603050405020304" pitchFamily="18" charset="0"/>
-                <a:cs typeface="Times New Roman" panose="02020603050405020304" pitchFamily="18" charset="0"/>
-              </a:rPr>
-              <a:t>deployment</a:t>
-            </a:r>
-            <a:r>
-              <a:rPr lang="en-US" dirty="0">
-                <a:latin typeface="Times New Roman" panose="02020603050405020304" pitchFamily="18" charset="0"/>
-                <a:cs typeface="Times New Roman" panose="02020603050405020304" pitchFamily="18" charset="0"/>
-              </a:rPr>
-              <a:t> on </a:t>
-            </a:r>
-            <a:r>
-              <a:rPr lang="en-US" b="1" dirty="0" err="1">
-                <a:latin typeface="Times New Roman" panose="02020603050405020304" pitchFamily="18" charset="0"/>
-                <a:cs typeface="Times New Roman" panose="02020603050405020304" pitchFamily="18" charset="0"/>
-              </a:rPr>
-              <a:t>Streamlit</a:t>
-            </a:r>
-            <a:r>
-              <a:rPr lang="en-US" dirty="0">
-                <a:latin typeface="Times New Roman" panose="02020603050405020304" pitchFamily="18" charset="0"/>
-                <a:cs typeface="Times New Roman" panose="02020603050405020304" pitchFamily="18" charset="0"/>
-              </a:rPr>
-              <a:t> and creating the </a:t>
-            </a:r>
-            <a:r>
-              <a:rPr lang="en-US" b="1" dirty="0">
-                <a:latin typeface="Times New Roman" panose="02020603050405020304" pitchFamily="18" charset="0"/>
-                <a:cs typeface="Times New Roman" panose="02020603050405020304" pitchFamily="18" charset="0"/>
-              </a:rPr>
-              <a:t>Grafana dashboard</a:t>
-            </a:r>
-            <a:r>
-              <a:rPr lang="en-US" dirty="0">
-                <a:latin typeface="Times New Roman" panose="02020603050405020304" pitchFamily="18" charset="0"/>
-                <a:cs typeface="Times New Roman" panose="02020603050405020304" pitchFamily="18" charset="0"/>
-              </a:rPr>
-              <a:t> for visualization.</a:t>
+              <a:t>: The Grafana dashboard, running on localhost, will visualize historical data, enhancing user understanding of trends and providing insights into stock performance over time.</a:t>
             </a:r>
           </a:p>
         </p:txBody>
@@ -14531,7 +14678,7 @@
           <p:cNvPr id="4" name="Date Placeholder 3">
             <a:extLst>
               <a:ext uri="{FF2B5EF4-FFF2-40B4-BE49-F238E27FC236}">
-                <a16:creationId xmlns:a16="http://schemas.microsoft.com/office/drawing/2014/main" id="{B8710486-8FC9-8B1F-8A38-035C2C636324}"/>
+                <a16:creationId xmlns:a16="http://schemas.microsoft.com/office/drawing/2014/main" id="{43F83EBD-4728-4836-3779-35AD88067941}"/>
               </a:ext>
             </a:extLst>
           </p:cNvPr>
@@ -14549,7 +14696,7 @@
           <a:p>
             <a:fld id="{3E200D22-A913-914D-B06C-E294256DAC47}" type="datetime1">
               <a:rPr lang="en-IN" smtClean="0"/>
-              <a:t>03-10-2024</a:t>
+              <a:t>04-10-2024</a:t>
             </a:fld>
             <a:endParaRPr lang="en-US"/>
           </a:p>
@@ -14560,7 +14707,7 @@
           <p:cNvPr id="5" name="Slide Number Placeholder 4">
             <a:extLst>
               <a:ext uri="{FF2B5EF4-FFF2-40B4-BE49-F238E27FC236}">
-                <a16:creationId xmlns:a16="http://schemas.microsoft.com/office/drawing/2014/main" id="{16693735-9CDF-80AD-786C-D35A5F4A7C89}"/>
+                <a16:creationId xmlns:a16="http://schemas.microsoft.com/office/drawing/2014/main" id="{EF9AD802-A1FA-5329-0CBC-B848F981BD7C}"/>
               </a:ext>
             </a:extLst>
           </p:cNvPr>
@@ -14587,7 +14734,7 @@
     </p:spTree>
     <p:extLst>
       <p:ext uri="{BB962C8B-B14F-4D97-AF65-F5344CB8AC3E}">
-        <p14:creationId xmlns:p14="http://schemas.microsoft.com/office/powerpoint/2010/main" val="3800335998"/>
+        <p14:creationId xmlns:p14="http://schemas.microsoft.com/office/powerpoint/2010/main" val="2165926810"/>
       </p:ext>
     </p:extLst>
   </p:cSld>

</xml_diff>